<commit_message>
Analyzing 400mEv and the top of the SW in 110 direction
</commit_message>
<xml_diff>
--- a/Jan2015/Summary2015.pptx
+++ b/Jan2015/Summary2015.pptx
@@ -3438,7 +3438,7 @@
         </p:blipFill>
         <p:spPr bwMode="auto">
           <a:xfrm>
-            <a:off x="20888" y="539752"/>
+            <a:off x="20888" y="652410"/>
             <a:ext cx="2400000" cy="1800000"/>
           </a:xfrm>
           <a:prstGeom prst="rect">
@@ -3502,7 +3502,7 @@
         </p:blipFill>
         <p:spPr bwMode="auto">
           <a:xfrm>
-            <a:off x="2132856" y="611760"/>
+            <a:off x="2132856" y="724418"/>
             <a:ext cx="2400000" cy="1800000"/>
           </a:xfrm>
           <a:prstGeom prst="rect">
@@ -3566,7 +3566,7 @@
         </p:blipFill>
         <p:spPr bwMode="auto">
           <a:xfrm>
-            <a:off x="4365104" y="611760"/>
+            <a:off x="4365104" y="724418"/>
             <a:ext cx="2400000" cy="1800000"/>
           </a:xfrm>
           <a:prstGeom prst="rect">
@@ -3615,7 +3615,7 @@
         </p:nvSpPr>
         <p:spPr>
           <a:xfrm>
-            <a:off x="318366" y="170220"/>
+            <a:off x="1669775" y="467544"/>
             <a:ext cx="4766818" cy="369332"/>
           </a:xfrm>
           <a:prstGeom prst="rect">
@@ -3729,7 +3729,7 @@
         </p:nvSpPr>
         <p:spPr>
           <a:xfrm>
-            <a:off x="260648" y="2402468"/>
+            <a:off x="260648" y="2515126"/>
             <a:ext cx="4925516" cy="369332"/>
           </a:xfrm>
           <a:prstGeom prst="rect">
@@ -3800,7 +3800,7 @@
         </p:blipFill>
         <p:spPr bwMode="auto">
           <a:xfrm>
-            <a:off x="2132856" y="2699992"/>
+            <a:off x="2132856" y="2812650"/>
             <a:ext cx="2400000" cy="1800000"/>
           </a:xfrm>
           <a:prstGeom prst="rect">
@@ -3864,7 +3864,7 @@
         </p:blipFill>
         <p:spPr bwMode="auto">
           <a:xfrm>
-            <a:off x="4365104" y="2772000"/>
+            <a:off x="4365104" y="2884658"/>
             <a:ext cx="2400000" cy="1800000"/>
           </a:xfrm>
           <a:prstGeom prst="rect">
@@ -3928,7 +3928,7 @@
         </p:blipFill>
         <p:spPr bwMode="auto">
           <a:xfrm>
-            <a:off x="20888" y="2772000"/>
+            <a:off x="20888" y="2884658"/>
             <a:ext cx="2400000" cy="1800000"/>
           </a:xfrm>
           <a:prstGeom prst="rect">
@@ -4050,7 +4050,7 @@
         </p:blipFill>
         <p:spPr bwMode="auto">
           <a:xfrm>
-            <a:off x="20888" y="4932240"/>
+            <a:off x="20888" y="5044898"/>
             <a:ext cx="2400000" cy="1800000"/>
           </a:xfrm>
           <a:prstGeom prst="rect">
@@ -4114,7 +4114,7 @@
         </p:blipFill>
         <p:spPr bwMode="auto">
           <a:xfrm>
-            <a:off x="4365104" y="4932240"/>
+            <a:off x="4365104" y="5044898"/>
             <a:ext cx="2400000" cy="1800000"/>
           </a:xfrm>
           <a:prstGeom prst="rect">
@@ -4300,8 +4300,8 @@
               <p:nvPr/>
             </p:nvSpPr>
             <p:spPr>
-              <a:xfrm rot="5400000">
-                <a:off x="5464346" y="3799035"/>
+              <a:xfrm>
+                <a:off x="2082445" y="98210"/>
                 <a:ext cx="2616757" cy="369332"/>
               </a:xfrm>
               <a:prstGeom prst="rect">
@@ -4387,8 +4387,8 @@
               <p:nvPr/>
             </p:nvSpPr>
             <p:spPr>
-              <a:xfrm rot="5400000">
-                <a:off x="5464346" y="3799035"/>
+              <a:xfrm>
+                <a:off x="2082445" y="98210"/>
                 <a:ext cx="2616757" cy="369332"/>
               </a:xfrm>
               <a:prstGeom prst="rect">
@@ -4397,7 +4397,7 @@
               <a:blipFill rotWithShape="1">
                 <a:blip r:embed="rId12"/>
                 <a:stretch>
-                  <a:fillRect l="-26667" t="-2098" r="-8333"/>
+                  <a:fillRect l="-2098" t="-8197" b="-24590"/>
                 </a:stretch>
               </a:blipFill>
             </p:spPr>
@@ -4529,12 +4529,15 @@
           <p:nvPr/>
         </p:nvSpPr>
         <p:spPr>
-          <a:xfrm>
-            <a:off x="6519507" y="570141"/>
-            <a:ext cx="210186" cy="6090091"/>
+          <a:xfrm rot="16200000">
+            <a:off x="3225768" y="-2721126"/>
+            <a:ext cx="235485" cy="6377337"/>
           </a:xfrm>
           <a:prstGeom prst="rightBrace">
-            <a:avLst/>
+            <a:avLst>
+              <a:gd name="adj1" fmla="val 8333"/>
+              <a:gd name="adj2" fmla="val 50116"/>
+            </a:avLst>
           </a:prstGeom>
         </p:spPr>
         <p:style>
@@ -4641,7 +4644,7 @@
         </p:blipFill>
         <p:spPr bwMode="auto">
           <a:xfrm>
-            <a:off x="2132856" y="4932240"/>
+            <a:off x="2132856" y="5044898"/>
             <a:ext cx="2400000" cy="1800000"/>
           </a:xfrm>
           <a:prstGeom prst="rect">
@@ -4690,7 +4693,7 @@
         </p:nvSpPr>
         <p:spPr>
           <a:xfrm>
-            <a:off x="175028" y="4562708"/>
+            <a:off x="175028" y="4675366"/>
             <a:ext cx="4539191" cy="369332"/>
           </a:xfrm>
           <a:prstGeom prst="rect">
@@ -4932,14 +4935,14 @@
       </p:grpSpPr>
       <p:pic>
         <p:nvPicPr>
-          <p:cNvPr id="1032" name="Picture 8"/>
+          <p:cNvPr id="2057" name="Picture 9"/>
           <p:cNvPicPr>
             <a:picLocks noChangeAspect="1" noChangeArrowheads="1"/>
           </p:cNvPicPr>
           <p:nvPr/>
         </p:nvPicPr>
         <p:blipFill>
-          <a:blip r:embed="rId2" cstate="print">
+          <a:blip r:embed="rId2">
             <a:extLst>
               <a:ext uri="{28A0092B-C50C-407E-A947-70E740481C1C}">
                 <a14:useLocalDpi xmlns:a14="http://schemas.microsoft.com/office/drawing/2010/main" val="0"/>
@@ -4953,7 +4956,7 @@
         </p:blipFill>
         <p:spPr bwMode="auto">
           <a:xfrm>
-            <a:off x="20888" y="4932240"/>
+            <a:off x="2253136" y="4499992"/>
             <a:ext cx="2400000" cy="1800000"/>
           </a:xfrm>
           <a:prstGeom prst="rect">
@@ -4996,14 +4999,14 @@
       </p:pic>
       <p:pic>
         <p:nvPicPr>
-          <p:cNvPr id="1034" name="Picture 10"/>
+          <p:cNvPr id="2058" name="Picture 10"/>
           <p:cNvPicPr>
             <a:picLocks noChangeAspect="1" noChangeArrowheads="1"/>
           </p:cNvPicPr>
           <p:nvPr/>
         </p:nvPicPr>
         <p:blipFill>
-          <a:blip r:embed="rId3" cstate="print">
+          <a:blip r:embed="rId3">
             <a:extLst>
               <a:ext uri="{28A0092B-C50C-407E-A947-70E740481C1C}">
                 <a14:useLocalDpi xmlns:a14="http://schemas.microsoft.com/office/drawing/2010/main" val="0"/>
@@ -5017,7 +5020,7 @@
         </p:blipFill>
         <p:spPr bwMode="auto">
           <a:xfrm>
-            <a:off x="4365104" y="4932240"/>
+            <a:off x="4437112" y="4499992"/>
             <a:ext cx="2400000" cy="1800000"/>
           </a:xfrm>
           <a:prstGeom prst="rect">
@@ -5060,14 +5063,14 @@
       </p:pic>
       <p:pic>
         <p:nvPicPr>
-          <p:cNvPr id="1035" name="Picture 11"/>
+          <p:cNvPr id="2054" name="Picture 6"/>
           <p:cNvPicPr>
             <a:picLocks noChangeAspect="1" noChangeArrowheads="1"/>
           </p:cNvPicPr>
           <p:nvPr/>
         </p:nvPicPr>
         <p:blipFill>
-          <a:blip r:embed="rId4" cstate="print">
+          <a:blip r:embed="rId4">
             <a:extLst>
               <a:ext uri="{28A0092B-C50C-407E-A947-70E740481C1C}">
                 <a14:useLocalDpi xmlns:a14="http://schemas.microsoft.com/office/drawing/2010/main" val="0"/>
@@ -5081,8 +5084,8 @@
         </p:blipFill>
         <p:spPr bwMode="auto">
           <a:xfrm>
-            <a:off x="404664" y="7020472"/>
-            <a:ext cx="2152048" cy="1800000"/>
+            <a:off x="2325144" y="2627984"/>
+            <a:ext cx="2400000" cy="1800000"/>
           </a:xfrm>
           <a:prstGeom prst="rect">
             <a:avLst/>
@@ -5122,88 +5125,16 @@
           </a:extLst>
         </p:spPr>
       </p:pic>
-      <p:sp>
-        <p:nvSpPr>
-          <p:cNvPr id="8" name="TextBox 7"/>
-          <p:cNvSpPr txBox="1"/>
-          <p:nvPr/>
-        </p:nvSpPr>
-        <p:spPr>
-          <a:xfrm>
-            <a:off x="260648" y="6722948"/>
-            <a:ext cx="2667718" cy="369332"/>
-          </a:xfrm>
-          <a:prstGeom prst="rect">
-            <a:avLst/>
-          </a:prstGeom>
-          <a:noFill/>
-        </p:spPr>
-        <p:txBody>
-          <a:bodyPr wrap="none" rtlCol="0">
-            <a:spAutoFit/>
-          </a:bodyPr>
-          <a:lstStyle/>
-          <a:p>
-            <a:r>
-              <a:rPr lang="en-GB" dirty="0" err="1" smtClean="0"/>
-              <a:t>dE</a:t>
-            </a:r>
-            <a:r>
-              <a:rPr lang="en-GB" dirty="0" smtClean="0"/>
-              <a:t>=70-75, &lt;±1,x,y&gt; </a:t>
-            </a:r>
-            <a:r>
-              <a:rPr lang="en-GB" dirty="0" err="1" smtClean="0"/>
-              <a:t>dK</a:t>
-            </a:r>
-            <a:r>
-              <a:rPr lang="en-GB" dirty="0" smtClean="0"/>
-              <a:t>=0.2</a:t>
-            </a:r>
-            <a:endParaRPr lang="en-GB" dirty="0"/>
-          </a:p>
-        </p:txBody>
-      </p:sp>
       <p:pic>
         <p:nvPicPr>
-          <p:cNvPr id="22" name="Picture 21"/>
-          <p:cNvPicPr>
-            <a:picLocks noChangeAspect="1"/>
-          </p:cNvPicPr>
-          <p:nvPr/>
-        </p:nvPicPr>
-        <p:blipFill>
-          <a:blip r:embed="rId5" cstate="print">
-            <a:extLst>
-              <a:ext uri="{28A0092B-C50C-407E-A947-70E740481C1C}">
-                <a14:useLocalDpi xmlns:a14="http://schemas.microsoft.com/office/drawing/2010/main" val="0"/>
-              </a:ext>
-            </a:extLst>
-          </a:blip>
-          <a:stretch>
-            <a:fillRect/>
-          </a:stretch>
-        </p:blipFill>
-        <p:spPr>
-          <a:xfrm>
-            <a:off x="4874181" y="6804248"/>
-            <a:ext cx="1939195" cy="1800000"/>
-          </a:xfrm>
-          <a:prstGeom prst="rect">
-            <a:avLst/>
-          </a:prstGeom>
-        </p:spPr>
-      </p:pic>
-      <p:pic>
-        <p:nvPicPr>
-          <p:cNvPr id="1037" name="Picture 13"/>
+          <p:cNvPr id="2055" name="Picture 7"/>
           <p:cNvPicPr>
             <a:picLocks noChangeAspect="1" noChangeArrowheads="1"/>
           </p:cNvPicPr>
           <p:nvPr/>
         </p:nvPicPr>
         <p:blipFill>
-          <a:blip r:embed="rId6" cstate="print">
+          <a:blip r:embed="rId5">
             <a:extLst>
               <a:ext uri="{28A0092B-C50C-407E-A947-70E740481C1C}">
                 <a14:useLocalDpi xmlns:a14="http://schemas.microsoft.com/office/drawing/2010/main" val="0"/>
@@ -5217,8 +5148,8 @@
         </p:blipFill>
         <p:spPr bwMode="auto">
           <a:xfrm>
-            <a:off x="3021184" y="6804488"/>
-            <a:ext cx="2064000" cy="2160000"/>
+            <a:off x="4437112" y="2571750"/>
+            <a:ext cx="2400000" cy="1800000"/>
           </a:xfrm>
           <a:prstGeom prst="rect">
             <a:avLst/>
@@ -5260,14 +5191,14 @@
       </p:pic>
       <p:sp>
         <p:nvSpPr>
-          <p:cNvPr id="26" name="TextBox 25"/>
+          <p:cNvPr id="15" name="TextBox 14"/>
           <p:cNvSpPr txBox="1"/>
           <p:nvPr/>
         </p:nvSpPr>
         <p:spPr>
           <a:xfrm>
-            <a:off x="3092870" y="6722948"/>
-            <a:ext cx="3135795" cy="369332"/>
+            <a:off x="316529" y="107504"/>
+            <a:ext cx="5223674" cy="369332"/>
           </a:xfrm>
           <a:prstGeom prst="rect">
             <a:avLst/>
@@ -5282,11 +5213,29 @@
           <a:p>
             <a:r>
               <a:rPr lang="en-GB" dirty="0" err="1" smtClean="0"/>
+              <a:t>Ei</a:t>
+            </a:r>
+            <a:r>
+              <a:rPr lang="en-GB" dirty="0" smtClean="0"/>
+              <a:t>=186 Bragg 200, Directions [100] (</a:t>
+            </a:r>
+            <a:r>
+              <a:rPr lang="en-GB" dirty="0" smtClean="0">
+                <a:latin typeface="Symbol" panose="05050102010706020507" pitchFamily="18" charset="2"/>
+              </a:rPr>
+              <a:t>G</a:t>
+            </a:r>
+            <a:r>
+              <a:rPr lang="en-GB" dirty="0" smtClean="0"/>
+              <a:t>H), </a:t>
+            </a:r>
+            <a:r>
+              <a:rPr lang="en-GB" dirty="0" err="1" smtClean="0"/>
               <a:t>dE</a:t>
             </a:r>
             <a:r>
               <a:rPr lang="en-GB" dirty="0" smtClean="0"/>
-              <a:t>=100-105, cut &lt;0,x,y&gt; </a:t>
+              <a:t>=5, </a:t>
             </a:r>
             <a:r>
               <a:rPr lang="en-GB" dirty="0" err="1" smtClean="0"/>
@@ -5294,7 +5243,7 @@
             </a:r>
             <a:r>
               <a:rPr lang="en-GB" dirty="0" smtClean="0"/>
-              <a:t>=0.2</a:t>
+              <a:t>=0.1</a:t>
             </a:r>
             <a:endParaRPr lang="en-GB" dirty="0"/>
           </a:p>
@@ -5302,14 +5251,14 @@
       </p:sp>
       <p:pic>
         <p:nvPicPr>
-          <p:cNvPr id="1033" name="Picture 9"/>
+          <p:cNvPr id="2050" name="Picture 2"/>
           <p:cNvPicPr>
             <a:picLocks noChangeAspect="1" noChangeArrowheads="1"/>
           </p:cNvPicPr>
           <p:nvPr/>
         </p:nvPicPr>
         <p:blipFill>
-          <a:blip r:embed="rId7" cstate="print">
+          <a:blip r:embed="rId6">
             <a:extLst>
               <a:ext uri="{28A0092B-C50C-407E-A947-70E740481C1C}">
                 <a14:useLocalDpi xmlns:a14="http://schemas.microsoft.com/office/drawing/2010/main" val="0"/>
@@ -5323,7 +5272,7 @@
         </p:blipFill>
         <p:spPr bwMode="auto">
           <a:xfrm>
-            <a:off x="2132856" y="4932240"/>
+            <a:off x="44624" y="467544"/>
             <a:ext cx="2400000" cy="1800000"/>
           </a:xfrm>
           <a:prstGeom prst="rect">
@@ -5364,238 +5313,16 @@
           </a:extLst>
         </p:spPr>
       </p:pic>
-      <p:sp>
-        <p:nvSpPr>
-          <p:cNvPr id="15" name="TextBox 14"/>
-          <p:cNvSpPr txBox="1"/>
-          <p:nvPr/>
-        </p:nvSpPr>
-        <p:spPr>
-          <a:xfrm>
-            <a:off x="316529" y="107504"/>
-            <a:ext cx="5223674" cy="369332"/>
-          </a:xfrm>
-          <a:prstGeom prst="rect">
-            <a:avLst/>
-          </a:prstGeom>
-          <a:noFill/>
-        </p:spPr>
-        <p:txBody>
-          <a:bodyPr wrap="none" rtlCol="0">
-            <a:spAutoFit/>
-          </a:bodyPr>
-          <a:lstStyle/>
-          <a:p>
-            <a:r>
-              <a:rPr lang="en-GB" dirty="0" err="1" smtClean="0"/>
-              <a:t>Ei</a:t>
-            </a:r>
-            <a:r>
-              <a:rPr lang="en-GB" dirty="0" smtClean="0"/>
-              <a:t>=186 Bragg 200, Directions [100] (</a:t>
-            </a:r>
-            <a:r>
-              <a:rPr lang="en-GB" dirty="0" smtClean="0">
-                <a:latin typeface="Symbol" panose="05050102010706020507" pitchFamily="18" charset="2"/>
-              </a:rPr>
-              <a:t>G</a:t>
-            </a:r>
-            <a:r>
-              <a:rPr lang="en-GB" dirty="0" smtClean="0"/>
-              <a:t>H), </a:t>
-            </a:r>
-            <a:r>
-              <a:rPr lang="en-GB" dirty="0" err="1" smtClean="0"/>
-              <a:t>dE</a:t>
-            </a:r>
-            <a:r>
-              <a:rPr lang="en-GB" dirty="0" smtClean="0"/>
-              <a:t>=5, </a:t>
-            </a:r>
-            <a:r>
-              <a:rPr lang="en-GB" dirty="0" err="1" smtClean="0"/>
-              <a:t>dK</a:t>
-            </a:r>
-            <a:r>
-              <a:rPr lang="en-GB" dirty="0" smtClean="0"/>
-              <a:t>=0.1</a:t>
-            </a:r>
-            <a:endParaRPr lang="en-GB" dirty="0"/>
-          </a:p>
-        </p:txBody>
-      </p:sp>
-      <p:cxnSp>
-        <p:nvCxnSpPr>
-          <p:cNvPr id="17" name="Straight Arrow Connector 16"/>
-          <p:cNvCxnSpPr/>
-          <p:nvPr/>
-        </p:nvCxnSpPr>
-        <p:spPr>
-          <a:xfrm flipV="1">
-            <a:off x="2723406" y="7380312"/>
-            <a:ext cx="1281658" cy="540160"/>
-          </a:xfrm>
-          <a:prstGeom prst="straightConnector1">
-            <a:avLst/>
-          </a:prstGeom>
-          <a:ln>
-            <a:tailEnd type="arrow"/>
-          </a:ln>
-        </p:spPr>
-        <p:style>
-          <a:lnRef idx="1">
-            <a:schemeClr val="accent1"/>
-          </a:lnRef>
-          <a:fillRef idx="0">
-            <a:schemeClr val="accent1"/>
-          </a:fillRef>
-          <a:effectRef idx="0">
-            <a:schemeClr val="accent1"/>
-          </a:effectRef>
-          <a:fontRef idx="minor">
-            <a:schemeClr val="tx1"/>
-          </a:fontRef>
-        </p:style>
-      </p:cxnSp>
-      <p:cxnSp>
-        <p:nvCxnSpPr>
-          <p:cNvPr id="19" name="Straight Arrow Connector 18"/>
-          <p:cNvCxnSpPr/>
-          <p:nvPr/>
-        </p:nvCxnSpPr>
-        <p:spPr>
-          <a:xfrm flipV="1">
-            <a:off x="2723406" y="7884488"/>
-            <a:ext cx="1497682" cy="35984"/>
-          </a:xfrm>
-          <a:prstGeom prst="straightConnector1">
-            <a:avLst/>
-          </a:prstGeom>
-          <a:ln>
-            <a:tailEnd type="arrow"/>
-          </a:ln>
-        </p:spPr>
-        <p:style>
-          <a:lnRef idx="1">
-            <a:schemeClr val="accent1"/>
-          </a:lnRef>
-          <a:fillRef idx="0">
-            <a:schemeClr val="accent1"/>
-          </a:fillRef>
-          <a:effectRef idx="0">
-            <a:schemeClr val="accent1"/>
-          </a:effectRef>
-          <a:fontRef idx="minor">
-            <a:schemeClr val="tx1"/>
-          </a:fontRef>
-        </p:style>
-      </p:cxnSp>
-      <p:sp>
-        <p:nvSpPr>
-          <p:cNvPr id="23" name="TextBox 22"/>
-          <p:cNvSpPr txBox="1"/>
-          <p:nvPr/>
-        </p:nvSpPr>
-        <p:spPr>
-          <a:xfrm>
-            <a:off x="2420888" y="7533148"/>
-            <a:ext cx="562975" cy="369332"/>
-          </a:xfrm>
-          <a:prstGeom prst="rect">
-            <a:avLst/>
-          </a:prstGeom>
-          <a:noFill/>
-        </p:spPr>
-        <p:txBody>
-          <a:bodyPr wrap="none" rtlCol="0">
-            <a:spAutoFit/>
-          </a:bodyPr>
-          <a:lstStyle/>
-          <a:p>
-            <a:r>
-              <a:rPr lang="en-GB" dirty="0" smtClean="0"/>
-              <a:t>Gap</a:t>
-            </a:r>
-            <a:endParaRPr lang="en-GB" dirty="0"/>
-          </a:p>
-        </p:txBody>
-      </p:sp>
-      <p:cxnSp>
-        <p:nvCxnSpPr>
-          <p:cNvPr id="25" name="Straight Arrow Connector 24"/>
-          <p:cNvCxnSpPr/>
-          <p:nvPr/>
-        </p:nvCxnSpPr>
-        <p:spPr>
-          <a:xfrm flipH="1" flipV="1">
-            <a:off x="1772816" y="7884488"/>
-            <a:ext cx="928959" cy="35984"/>
-          </a:xfrm>
-          <a:prstGeom prst="straightConnector1">
-            <a:avLst/>
-          </a:prstGeom>
-          <a:ln>
-            <a:tailEnd type="arrow"/>
-          </a:ln>
-        </p:spPr>
-        <p:style>
-          <a:lnRef idx="1">
-            <a:schemeClr val="accent1"/>
-          </a:lnRef>
-          <a:fillRef idx="0">
-            <a:schemeClr val="accent1"/>
-          </a:fillRef>
-          <a:effectRef idx="0">
-            <a:schemeClr val="accent1"/>
-          </a:effectRef>
-          <a:fontRef idx="minor">
-            <a:schemeClr val="tx1"/>
-          </a:fontRef>
-        </p:style>
-      </p:cxnSp>
-      <p:cxnSp>
-        <p:nvCxnSpPr>
-          <p:cNvPr id="29" name="Straight Arrow Connector 28"/>
-          <p:cNvCxnSpPr/>
-          <p:nvPr/>
-        </p:nvCxnSpPr>
-        <p:spPr>
-          <a:xfrm flipH="1">
-            <a:off x="1412776" y="7920472"/>
-            <a:ext cx="1289600" cy="323936"/>
-          </a:xfrm>
-          <a:prstGeom prst="straightConnector1">
-            <a:avLst/>
-          </a:prstGeom>
-          <a:ln>
-            <a:tailEnd type="arrow"/>
-          </a:ln>
-        </p:spPr>
-        <p:style>
-          <a:lnRef idx="1">
-            <a:schemeClr val="accent1"/>
-          </a:lnRef>
-          <a:fillRef idx="0">
-            <a:schemeClr val="accent1"/>
-          </a:fillRef>
-          <a:effectRef idx="0">
-            <a:schemeClr val="accent1"/>
-          </a:effectRef>
-          <a:fontRef idx="minor">
-            <a:schemeClr val="tx1"/>
-          </a:fontRef>
-        </p:style>
-      </p:cxnSp>
       <p:pic>
         <p:nvPicPr>
-          <p:cNvPr id="2050" name="Picture 2"/>
+          <p:cNvPr id="2051" name="Picture 3"/>
           <p:cNvPicPr>
             <a:picLocks noChangeAspect="1" noChangeArrowheads="1"/>
           </p:cNvPicPr>
           <p:nvPr/>
         </p:nvPicPr>
         <p:blipFill>
-          <a:blip r:embed="rId8">
+          <a:blip r:embed="rId7">
             <a:extLst>
               <a:ext uri="{28A0092B-C50C-407E-A947-70E740481C1C}">
                 <a14:useLocalDpi xmlns:a14="http://schemas.microsoft.com/office/drawing/2010/main" val="0"/>
@@ -5609,7 +5336,7 @@
         </p:blipFill>
         <p:spPr bwMode="auto">
           <a:xfrm>
-            <a:off x="44624" y="467544"/>
+            <a:off x="4341368" y="467544"/>
             <a:ext cx="2400000" cy="1800000"/>
           </a:xfrm>
           <a:prstGeom prst="rect">
@@ -5652,14 +5379,14 @@
       </p:pic>
       <p:pic>
         <p:nvPicPr>
-          <p:cNvPr id="2051" name="Picture 3"/>
+          <p:cNvPr id="2052" name="Picture 4"/>
           <p:cNvPicPr>
             <a:picLocks noChangeAspect="1" noChangeArrowheads="1"/>
           </p:cNvPicPr>
           <p:nvPr/>
         </p:nvPicPr>
         <p:blipFill>
-          <a:blip r:embed="rId9">
+          <a:blip r:embed="rId8">
             <a:extLst>
               <a:ext uri="{28A0092B-C50C-407E-A947-70E740481C1C}">
                 <a14:useLocalDpi xmlns:a14="http://schemas.microsoft.com/office/drawing/2010/main" val="0"/>
@@ -5673,7 +5400,7 @@
         </p:blipFill>
         <p:spPr bwMode="auto">
           <a:xfrm>
-            <a:off x="4341368" y="467544"/>
+            <a:off x="2132856" y="467544"/>
             <a:ext cx="2400000" cy="1800000"/>
           </a:xfrm>
           <a:prstGeom prst="rect">
@@ -5714,9 +5441,192 @@
           </a:extLst>
         </p:spPr>
       </p:pic>
+      <p:sp>
+        <p:nvSpPr>
+          <p:cNvPr id="28" name="TextBox 27"/>
+          <p:cNvSpPr txBox="1"/>
+          <p:nvPr/>
+        </p:nvSpPr>
+        <p:spPr>
+          <a:xfrm>
+            <a:off x="4630009" y="683568"/>
+            <a:ext cx="1879041" cy="369332"/>
+          </a:xfrm>
+          <a:prstGeom prst="rect">
+            <a:avLst/>
+          </a:prstGeom>
+          <a:noFill/>
+        </p:spPr>
+        <p:txBody>
+          <a:bodyPr wrap="none" rtlCol="0">
+            <a:spAutoFit/>
+          </a:bodyPr>
+          <a:lstStyle/>
+          <a:p>
+            <a:r>
+              <a:rPr lang="en-GB" i="1" dirty="0" smtClean="0"/>
+              <a:t>|D|=</a:t>
+            </a:r>
+            <a:r>
+              <a:rPr lang="en-GB" dirty="0" smtClean="0"/>
+              <a:t>237 [</a:t>
+            </a:r>
+            <a:r>
+              <a:rPr lang="en-GB" sz="1400" dirty="0" err="1" smtClean="0"/>
+              <a:t>meV</a:t>
+            </a:r>
+            <a:r>
+              <a:rPr lang="en-GB" sz="1400" dirty="0" smtClean="0"/>
+              <a:t>*</a:t>
+            </a:r>
+            <a:r>
+              <a:rPr lang="en-GB" sz="1400" dirty="0" smtClean="0">
+                <a:latin typeface="Symbol" panose="05050102010706020507" pitchFamily="18" charset="2"/>
+              </a:rPr>
+              <a:t>A</a:t>
+            </a:r>
+            <a:r>
+              <a:rPr lang="en-GB" sz="1400" baseline="30000" dirty="0" smtClean="0">
+                <a:latin typeface="Symbol" panose="05050102010706020507" pitchFamily="18" charset="2"/>
+              </a:rPr>
+              <a:t>-2</a:t>
+            </a:r>
+            <a:r>
+              <a:rPr lang="en-GB" dirty="0" smtClean="0"/>
+              <a:t>]</a:t>
+            </a:r>
+            <a:endParaRPr lang="en-GB" dirty="0"/>
+          </a:p>
+        </p:txBody>
+      </p:sp>
+      <mc:AlternateContent xmlns:mc="http://schemas.openxmlformats.org/markup-compatibility/2006">
+        <mc:Choice xmlns:a14="http://schemas.microsoft.com/office/drawing/2010/main" Requires="a14">
+          <p:sp>
+            <p:nvSpPr>
+              <p:cNvPr id="32" name="TextBox 31"/>
+              <p:cNvSpPr txBox="1"/>
+              <p:nvPr/>
+            </p:nvSpPr>
+            <p:spPr>
+              <a:xfrm>
+                <a:off x="1988840" y="2123728"/>
+                <a:ext cx="2616757" cy="369332"/>
+              </a:xfrm>
+              <a:prstGeom prst="rect">
+                <a:avLst/>
+              </a:prstGeom>
+              <a:noFill/>
+            </p:spPr>
+            <p:txBody>
+              <a:bodyPr wrap="square" rtlCol="0">
+                <a:spAutoFit/>
+              </a:bodyPr>
+              <a:lstStyle/>
+              <a:p>
+                <a:r>
+                  <a:rPr lang="en-GB" dirty="0" smtClean="0"/>
+                  <a:t>Ei = 400; </a:t>
+                </a:r>
+                <a14:m>
+                  <m:oMath xmlns:m="http://schemas.openxmlformats.org/officeDocument/2006/math">
+                    <m:r>
+                      <a:rPr lang="en-GB" b="0" i="0" smtClean="0">
+                        <a:latin typeface="Cambria Math"/>
+                      </a:rPr>
+                      <m:t>  </m:t>
+                    </m:r>
+                    <m:r>
+                      <a:rPr lang="en-GB" b="0" i="1" smtClean="0">
+                        <a:latin typeface="Cambria Math"/>
+                      </a:rPr>
+                      <m:t>𝐸</m:t>
+                    </m:r>
+                    <m:r>
+                      <a:rPr lang="en-GB" b="0" i="1" smtClean="0">
+                        <a:latin typeface="Cambria Math"/>
+                      </a:rPr>
+                      <m:t>=</m:t>
+                    </m:r>
+                    <m:r>
+                      <a:rPr lang="en-GB" b="0" i="1" smtClean="0">
+                        <a:latin typeface="Cambria Math"/>
+                      </a:rPr>
+                      <m:t>𝐷</m:t>
+                    </m:r>
+                    <m:sSup>
+                      <m:sSupPr>
+                        <m:ctrlPr>
+                          <a:rPr lang="en-GB" i="1" smtClean="0">
+                            <a:latin typeface="Cambria Math"/>
+                          </a:rPr>
+                        </m:ctrlPr>
+                      </m:sSupPr>
+                      <m:e>
+                        <m:r>
+                          <a:rPr lang="en-GB" b="0" i="1" smtClean="0">
+                            <a:latin typeface="Cambria Math"/>
+                          </a:rPr>
+                          <m:t>𝑞</m:t>
+                        </m:r>
+                      </m:e>
+                      <m:sup>
+                        <m:r>
+                          <a:rPr lang="en-GB" i="1" smtClean="0">
+                            <a:latin typeface="Cambria Math"/>
+                          </a:rPr>
+                          <m:t>2</m:t>
+                        </m:r>
+                      </m:sup>
+                    </m:sSup>
+                  </m:oMath>
+                </a14:m>
+                <a:endParaRPr lang="en-GB" dirty="0"/>
+              </a:p>
+            </p:txBody>
+          </p:sp>
+        </mc:Choice>
+        <mc:Fallback>
+          <p:sp>
+            <p:nvSpPr>
+              <p:cNvPr id="32" name="TextBox 31"/>
+              <p:cNvSpPr txBox="1">
+                <a:spLocks noRot="1" noChangeAspect="1" noMove="1" noResize="1" noEditPoints="1" noAdjustHandles="1" noChangeArrowheads="1" noChangeShapeType="1" noTextEdit="1"/>
+              </p:cNvSpPr>
+              <p:nvPr/>
+            </p:nvSpPr>
+            <p:spPr>
+              <a:xfrm>
+                <a:off x="1988840" y="2123728"/>
+                <a:ext cx="2616757" cy="369332"/>
+              </a:xfrm>
+              <a:prstGeom prst="rect">
+                <a:avLst/>
+              </a:prstGeom>
+              <a:blipFill rotWithShape="1">
+                <a:blip r:embed="rId9"/>
+                <a:stretch>
+                  <a:fillRect l="-1860" t="-8197" b="-24590"/>
+                </a:stretch>
+              </a:blipFill>
+            </p:spPr>
+            <p:txBody>
+              <a:bodyPr/>
+              <a:lstStyle/>
+              <a:p>
+                <a:r>
+                  <a:rPr lang="en-GB">
+                    <a:noFill/>
+                  </a:rPr>
+                  <a:t> </a:t>
+                </a:r>
+              </a:p>
+            </p:txBody>
+          </p:sp>
+        </mc:Fallback>
+      </mc:AlternateContent>
       <p:pic>
         <p:nvPicPr>
-          <p:cNvPr id="2052" name="Picture 4"/>
+          <p:cNvPr id="2053" name="Picture 5"/>
           <p:cNvPicPr>
             <a:picLocks noChangeAspect="1" noChangeArrowheads="1"/>
           </p:cNvPicPr>
@@ -5737,7 +5647,7 @@
         </p:blipFill>
         <p:spPr bwMode="auto">
           <a:xfrm>
-            <a:off x="2132856" y="467544"/>
+            <a:off x="188640" y="2555776"/>
             <a:ext cx="2400000" cy="1800000"/>
           </a:xfrm>
           <a:prstGeom prst="rect">
@@ -5780,14 +5690,55 @@
       </p:pic>
       <p:sp>
         <p:nvSpPr>
-          <p:cNvPr id="28" name="TextBox 27"/>
+          <p:cNvPr id="33" name="Right Brace 32"/>
+          <p:cNvSpPr/>
+          <p:nvPr/>
+        </p:nvSpPr>
+        <p:spPr>
+          <a:xfrm rot="16200000">
+            <a:off x="3290941" y="-731173"/>
+            <a:ext cx="235485" cy="6377337"/>
+          </a:xfrm>
+          <a:prstGeom prst="rightBrace">
+            <a:avLst>
+              <a:gd name="adj1" fmla="val 8333"/>
+              <a:gd name="adj2" fmla="val 50116"/>
+            </a:avLst>
+          </a:prstGeom>
+        </p:spPr>
+        <p:style>
+          <a:lnRef idx="1">
+            <a:schemeClr val="accent1"/>
+          </a:lnRef>
+          <a:fillRef idx="0">
+            <a:schemeClr val="accent1"/>
+          </a:fillRef>
+          <a:effectRef idx="0">
+            <a:schemeClr val="accent1"/>
+          </a:effectRef>
+          <a:fontRef idx="minor">
+            <a:schemeClr val="tx1"/>
+          </a:fontRef>
+        </p:style>
+        <p:txBody>
+          <a:bodyPr rtlCol="0" anchor="ctr"/>
+          <a:lstStyle/>
+          <a:p>
+            <a:pPr algn="ctr"/>
+            <a:endParaRPr lang="en-GB"/>
+          </a:p>
+        </p:txBody>
+      </p:sp>
+      <p:sp>
+        <p:nvSpPr>
+          <p:cNvPr id="35" name="TextBox 34"/>
           <p:cNvSpPr txBox="1"/>
           <p:nvPr/>
         </p:nvSpPr>
         <p:spPr>
           <a:xfrm>
-            <a:off x="4630009" y="683568"/>
-            <a:ext cx="1879041" cy="369332"/>
+            <a:off x="822422" y="2411760"/>
+            <a:ext cx="4539191" cy="369332"/>
           </a:xfrm>
           <a:prstGeom prst="rect">
             <a:avLst/>
@@ -5801,20 +5752,68 @@
           <a:lstStyle/>
           <a:p>
             <a:r>
+              <a:rPr lang="en-GB" dirty="0" smtClean="0"/>
+              <a:t>Bragg 110, Directions [100] (</a:t>
+            </a:r>
+            <a:r>
+              <a:rPr lang="en-GB" dirty="0" smtClean="0">
+                <a:latin typeface="Symbol" panose="05050102010706020507" pitchFamily="18" charset="2"/>
+              </a:rPr>
+              <a:t>G</a:t>
+            </a:r>
+            <a:r>
+              <a:rPr lang="en-GB" dirty="0" smtClean="0"/>
+              <a:t>H), </a:t>
+            </a:r>
+            <a:r>
+              <a:rPr lang="en-GB" dirty="0" err="1" smtClean="0"/>
+              <a:t>dE</a:t>
+            </a:r>
+            <a:r>
+              <a:rPr lang="en-GB" dirty="0" smtClean="0"/>
+              <a:t>=5, </a:t>
+            </a:r>
+            <a:r>
+              <a:rPr lang="en-GB" dirty="0" err="1" smtClean="0"/>
+              <a:t>dK</a:t>
+            </a:r>
+            <a:r>
+              <a:rPr lang="en-GB" dirty="0" smtClean="0"/>
+              <a:t>=0.1</a:t>
+            </a:r>
+            <a:endParaRPr lang="en-GB" dirty="0"/>
+          </a:p>
+        </p:txBody>
+      </p:sp>
+      <p:sp>
+        <p:nvSpPr>
+          <p:cNvPr id="38" name="TextBox 37"/>
+          <p:cNvSpPr txBox="1"/>
+          <p:nvPr/>
+        </p:nvSpPr>
+        <p:spPr>
+          <a:xfrm>
+            <a:off x="4797152" y="2699792"/>
+            <a:ext cx="1879041" cy="369332"/>
+          </a:xfrm>
+          <a:prstGeom prst="rect">
+            <a:avLst/>
+          </a:prstGeom>
+          <a:noFill/>
+        </p:spPr>
+        <p:txBody>
+          <a:bodyPr wrap="none" rtlCol="0">
+            <a:spAutoFit/>
+          </a:bodyPr>
+          <a:lstStyle/>
+          <a:p>
+            <a:r>
               <a:rPr lang="en-GB" i="1" dirty="0" smtClean="0"/>
-              <a:t>|D</a:t>
-            </a:r>
-            <a:r>
-              <a:rPr lang="en-GB" i="1" smtClean="0"/>
-              <a:t>|=</a:t>
-            </a:r>
-            <a:r>
-              <a:rPr lang="en-GB" smtClean="0"/>
-              <a:t>237 </a:t>
+              <a:t>|D|=</a:t>
             </a:r>
             <a:r>
               <a:rPr lang="en-GB" dirty="0" smtClean="0"/>
-              <a:t>[</a:t>
+              <a:t>237 [</a:t>
             </a:r>
             <a:r>
               <a:rPr lang="en-GB" sz="1400" dirty="0" err="1" smtClean="0"/>
@@ -5841,6 +5840,1084 @@
               <a:t>]</a:t>
             </a:r>
             <a:endParaRPr lang="en-GB" dirty="0"/>
+          </a:p>
+        </p:txBody>
+      </p:sp>
+      <p:pic>
+        <p:nvPicPr>
+          <p:cNvPr id="2056" name="Picture 8"/>
+          <p:cNvPicPr>
+            <a:picLocks noChangeAspect="1" noChangeArrowheads="1"/>
+          </p:cNvPicPr>
+          <p:nvPr/>
+        </p:nvPicPr>
+        <p:blipFill>
+          <a:blip r:embed="rId11">
+            <a:extLst>
+              <a:ext uri="{28A0092B-C50C-407E-A947-70E740481C1C}">
+                <a14:useLocalDpi xmlns:a14="http://schemas.microsoft.com/office/drawing/2010/main" val="0"/>
+              </a:ext>
+            </a:extLst>
+          </a:blip>
+          <a:srcRect/>
+          <a:stretch>
+            <a:fillRect/>
+          </a:stretch>
+        </p:blipFill>
+        <p:spPr bwMode="auto">
+          <a:xfrm>
+            <a:off x="44624" y="4499992"/>
+            <a:ext cx="2400000" cy="1800000"/>
+          </a:xfrm>
+          <a:prstGeom prst="rect">
+            <a:avLst/>
+          </a:prstGeom>
+          <a:noFill/>
+          <a:ln>
+            <a:noFill/>
+          </a:ln>
+          <a:effectLst/>
+          <a:extLst>
+            <a:ext uri="{909E8E84-426E-40DD-AFC4-6F175D3DCCD1}">
+              <a14:hiddenFill xmlns:a14="http://schemas.microsoft.com/office/drawing/2010/main">
+                <a:solidFill>
+                  <a:schemeClr val="accent1"/>
+                </a:solidFill>
+              </a14:hiddenFill>
+            </a:ext>
+            <a:ext uri="{91240B29-F687-4F45-9708-019B960494DF}">
+              <a14:hiddenLine xmlns:a14="http://schemas.microsoft.com/office/drawing/2010/main" w="9525">
+                <a:solidFill>
+                  <a:schemeClr val="tx1"/>
+                </a:solidFill>
+                <a:miter lim="800000"/>
+                <a:headEnd/>
+                <a:tailEnd/>
+              </a14:hiddenLine>
+            </a:ext>
+            <a:ext uri="{AF507438-7753-43E0-B8FC-AC1667EBCBE1}">
+              <a14:hiddenEffects xmlns:a14="http://schemas.microsoft.com/office/drawing/2010/main">
+                <a:effectLst>
+                  <a:outerShdw dist="35921" dir="2700000" algn="ctr" rotWithShape="0">
+                    <a:schemeClr val="bg2"/>
+                  </a:outerShdw>
+                </a:effectLst>
+              </a14:hiddenEffects>
+            </a:ext>
+          </a:extLst>
+        </p:spPr>
+      </p:pic>
+      <p:sp>
+        <p:nvSpPr>
+          <p:cNvPr id="42" name="TextBox 41"/>
+          <p:cNvSpPr txBox="1"/>
+          <p:nvPr/>
+        </p:nvSpPr>
+        <p:spPr>
+          <a:xfrm>
+            <a:off x="974822" y="4202668"/>
+            <a:ext cx="4539191" cy="369332"/>
+          </a:xfrm>
+          <a:prstGeom prst="rect">
+            <a:avLst/>
+          </a:prstGeom>
+          <a:noFill/>
+        </p:spPr>
+        <p:txBody>
+          <a:bodyPr wrap="none" rtlCol="0">
+            <a:spAutoFit/>
+          </a:bodyPr>
+          <a:lstStyle/>
+          <a:p>
+            <a:r>
+              <a:rPr lang="en-GB" dirty="0" smtClean="0"/>
+              <a:t>Bragg 200, Directions [100] (</a:t>
+            </a:r>
+            <a:r>
+              <a:rPr lang="en-GB" dirty="0" smtClean="0">
+                <a:latin typeface="Symbol" panose="05050102010706020507" pitchFamily="18" charset="2"/>
+              </a:rPr>
+              <a:t>G</a:t>
+            </a:r>
+            <a:r>
+              <a:rPr lang="en-GB" dirty="0" smtClean="0"/>
+              <a:t>H), </a:t>
+            </a:r>
+            <a:r>
+              <a:rPr lang="en-GB" dirty="0" err="1" smtClean="0"/>
+              <a:t>dE</a:t>
+            </a:r>
+            <a:r>
+              <a:rPr lang="en-GB" dirty="0" smtClean="0"/>
+              <a:t>=5, </a:t>
+            </a:r>
+            <a:r>
+              <a:rPr lang="en-GB" dirty="0" err="1" smtClean="0"/>
+              <a:t>dK</a:t>
+            </a:r>
+            <a:r>
+              <a:rPr lang="en-GB" dirty="0" smtClean="0"/>
+              <a:t>=0.1</a:t>
+            </a:r>
+            <a:endParaRPr lang="en-GB" dirty="0"/>
+          </a:p>
+        </p:txBody>
+      </p:sp>
+      <p:sp>
+        <p:nvSpPr>
+          <p:cNvPr id="43" name="TextBox 42"/>
+          <p:cNvSpPr txBox="1"/>
+          <p:nvPr/>
+        </p:nvSpPr>
+        <p:spPr>
+          <a:xfrm>
+            <a:off x="4797152" y="4572000"/>
+            <a:ext cx="1879041" cy="369332"/>
+          </a:xfrm>
+          <a:prstGeom prst="rect">
+            <a:avLst/>
+          </a:prstGeom>
+          <a:noFill/>
+        </p:spPr>
+        <p:txBody>
+          <a:bodyPr wrap="none" rtlCol="0">
+            <a:spAutoFit/>
+          </a:bodyPr>
+          <a:lstStyle/>
+          <a:p>
+            <a:r>
+              <a:rPr lang="en-GB" i="1" dirty="0" smtClean="0"/>
+              <a:t>|D|=</a:t>
+            </a:r>
+            <a:r>
+              <a:rPr lang="en-GB" dirty="0" smtClean="0"/>
+              <a:t>230 [</a:t>
+            </a:r>
+            <a:r>
+              <a:rPr lang="en-GB" sz="1400" dirty="0" err="1" smtClean="0"/>
+              <a:t>meV</a:t>
+            </a:r>
+            <a:r>
+              <a:rPr lang="en-GB" sz="1400" dirty="0" smtClean="0"/>
+              <a:t>*</a:t>
+            </a:r>
+            <a:r>
+              <a:rPr lang="en-GB" sz="1400" dirty="0" smtClean="0">
+                <a:latin typeface="Symbol" panose="05050102010706020507" pitchFamily="18" charset="2"/>
+              </a:rPr>
+              <a:t>A</a:t>
+            </a:r>
+            <a:r>
+              <a:rPr lang="en-GB" sz="1400" baseline="30000" dirty="0" smtClean="0">
+                <a:latin typeface="Symbol" panose="05050102010706020507" pitchFamily="18" charset="2"/>
+              </a:rPr>
+              <a:t>-2</a:t>
+            </a:r>
+            <a:r>
+              <a:rPr lang="en-GB" dirty="0" smtClean="0"/>
+              <a:t>]</a:t>
+            </a:r>
+            <a:endParaRPr lang="en-GB" dirty="0"/>
+          </a:p>
+        </p:txBody>
+      </p:sp>
+      <p:pic>
+        <p:nvPicPr>
+          <p:cNvPr id="2060" name="Picture 12"/>
+          <p:cNvPicPr>
+            <a:picLocks noChangeAspect="1" noChangeArrowheads="1"/>
+          </p:cNvPicPr>
+          <p:nvPr/>
+        </p:nvPicPr>
+        <p:blipFill>
+          <a:blip r:embed="rId12">
+            <a:extLst>
+              <a:ext uri="{28A0092B-C50C-407E-A947-70E740481C1C}">
+                <a14:useLocalDpi xmlns:a14="http://schemas.microsoft.com/office/drawing/2010/main" val="0"/>
+              </a:ext>
+            </a:extLst>
+          </a:blip>
+          <a:srcRect/>
+          <a:stretch>
+            <a:fillRect/>
+          </a:stretch>
+        </p:blipFill>
+        <p:spPr bwMode="auto">
+          <a:xfrm>
+            <a:off x="2829200" y="6948464"/>
+            <a:ext cx="2400000" cy="1800000"/>
+          </a:xfrm>
+          <a:prstGeom prst="rect">
+            <a:avLst/>
+          </a:prstGeom>
+          <a:noFill/>
+          <a:ln>
+            <a:noFill/>
+          </a:ln>
+          <a:effectLst/>
+          <a:extLst>
+            <a:ext uri="{909E8E84-426E-40DD-AFC4-6F175D3DCCD1}">
+              <a14:hiddenFill xmlns:a14="http://schemas.microsoft.com/office/drawing/2010/main">
+                <a:solidFill>
+                  <a:schemeClr val="accent1"/>
+                </a:solidFill>
+              </a14:hiddenFill>
+            </a:ext>
+            <a:ext uri="{91240B29-F687-4F45-9708-019B960494DF}">
+              <a14:hiddenLine xmlns:a14="http://schemas.microsoft.com/office/drawing/2010/main" w="9525">
+                <a:solidFill>
+                  <a:schemeClr val="tx1"/>
+                </a:solidFill>
+                <a:miter lim="800000"/>
+                <a:headEnd/>
+                <a:tailEnd/>
+              </a14:hiddenLine>
+            </a:ext>
+            <a:ext uri="{AF507438-7753-43E0-B8FC-AC1667EBCBE1}">
+              <a14:hiddenEffects xmlns:a14="http://schemas.microsoft.com/office/drawing/2010/main">
+                <a:effectLst>
+                  <a:outerShdw dist="35921" dir="2700000" algn="ctr" rotWithShape="0">
+                    <a:schemeClr val="bg2"/>
+                  </a:outerShdw>
+                </a:effectLst>
+              </a14:hiddenEffects>
+            </a:ext>
+          </a:extLst>
+        </p:spPr>
+      </p:pic>
+      <p:pic>
+        <p:nvPicPr>
+          <p:cNvPr id="2061" name="Picture 13"/>
+          <p:cNvPicPr>
+            <a:picLocks noChangeAspect="1" noChangeArrowheads="1"/>
+          </p:cNvPicPr>
+          <p:nvPr/>
+        </p:nvPicPr>
+        <p:blipFill>
+          <a:blip r:embed="rId13" cstate="print">
+            <a:extLst>
+              <a:ext uri="{28A0092B-C50C-407E-A947-70E740481C1C}">
+                <a14:useLocalDpi xmlns:a14="http://schemas.microsoft.com/office/drawing/2010/main" val="0"/>
+              </a:ext>
+            </a:extLst>
+          </a:blip>
+          <a:srcRect/>
+          <a:stretch>
+            <a:fillRect/>
+          </a:stretch>
+        </p:blipFill>
+        <p:spPr bwMode="auto">
+          <a:xfrm>
+            <a:off x="4653136" y="6948464"/>
+            <a:ext cx="2158806" cy="1800000"/>
+          </a:xfrm>
+          <a:prstGeom prst="rect">
+            <a:avLst/>
+          </a:prstGeom>
+          <a:noFill/>
+          <a:ln>
+            <a:noFill/>
+          </a:ln>
+          <a:effectLst/>
+          <a:extLst>
+            <a:ext uri="{909E8E84-426E-40DD-AFC4-6F175D3DCCD1}">
+              <a14:hiddenFill xmlns:a14="http://schemas.microsoft.com/office/drawing/2010/main">
+                <a:solidFill>
+                  <a:schemeClr val="accent1"/>
+                </a:solidFill>
+              </a14:hiddenFill>
+            </a:ext>
+            <a:ext uri="{91240B29-F687-4F45-9708-019B960494DF}">
+              <a14:hiddenLine xmlns:a14="http://schemas.microsoft.com/office/drawing/2010/main" w="9525">
+                <a:solidFill>
+                  <a:schemeClr val="tx1"/>
+                </a:solidFill>
+                <a:miter lim="800000"/>
+                <a:headEnd/>
+                <a:tailEnd/>
+              </a14:hiddenLine>
+            </a:ext>
+            <a:ext uri="{AF507438-7753-43E0-B8FC-AC1667EBCBE1}">
+              <a14:hiddenEffects xmlns:a14="http://schemas.microsoft.com/office/drawing/2010/main">
+                <a:effectLst>
+                  <a:outerShdw dist="35921" dir="2700000" algn="ctr" rotWithShape="0">
+                    <a:schemeClr val="bg2"/>
+                  </a:outerShdw>
+                </a:effectLst>
+              </a14:hiddenEffects>
+            </a:ext>
+          </a:extLst>
+        </p:spPr>
+      </p:pic>
+      <p:cxnSp>
+        <p:nvCxnSpPr>
+          <p:cNvPr id="3" name="Straight Arrow Connector 2"/>
+          <p:cNvCxnSpPr/>
+          <p:nvPr/>
+        </p:nvCxnSpPr>
+        <p:spPr>
+          <a:xfrm>
+            <a:off x="5373216" y="7358784"/>
+            <a:ext cx="648072" cy="445911"/>
+          </a:xfrm>
+          <a:prstGeom prst="straightConnector1">
+            <a:avLst/>
+          </a:prstGeom>
+          <a:ln w="25400">
+            <a:solidFill>
+              <a:srgbClr val="FF0000"/>
+            </a:solidFill>
+            <a:tailEnd type="arrow"/>
+          </a:ln>
+        </p:spPr>
+        <p:style>
+          <a:lnRef idx="1">
+            <a:schemeClr val="accent1"/>
+          </a:lnRef>
+          <a:fillRef idx="0">
+            <a:schemeClr val="accent1"/>
+          </a:fillRef>
+          <a:effectRef idx="0">
+            <a:schemeClr val="accent1"/>
+          </a:effectRef>
+          <a:fontRef idx="minor">
+            <a:schemeClr val="tx1"/>
+          </a:fontRef>
+        </p:style>
+      </p:cxnSp>
+      <p:sp>
+        <p:nvSpPr>
+          <p:cNvPr id="12" name="TextBox 11"/>
+          <p:cNvSpPr txBox="1"/>
+          <p:nvPr/>
+        </p:nvSpPr>
+        <p:spPr>
+          <a:xfrm>
+            <a:off x="292022" y="6516216"/>
+            <a:ext cx="6377338" cy="369332"/>
+          </a:xfrm>
+          <a:prstGeom prst="rect">
+            <a:avLst/>
+          </a:prstGeom>
+          <a:noFill/>
+        </p:spPr>
+        <p:txBody>
+          <a:bodyPr wrap="square" rtlCol="0">
+            <a:spAutoFit/>
+          </a:bodyPr>
+          <a:lstStyle/>
+          <a:p>
+            <a:r>
+              <a:rPr lang="en-GB" dirty="0" smtClean="0"/>
+              <a:t>SW intersection observed at dE~250 in direction 200-&gt;3(-1)0?</a:t>
+            </a:r>
+            <a:endParaRPr lang="en-GB" dirty="0"/>
+          </a:p>
+        </p:txBody>
+      </p:sp>
+      <p:pic>
+        <p:nvPicPr>
+          <p:cNvPr id="2062" name="Picture 14"/>
+          <p:cNvPicPr>
+            <a:picLocks noChangeAspect="1" noChangeArrowheads="1"/>
+          </p:cNvPicPr>
+          <p:nvPr/>
+        </p:nvPicPr>
+        <p:blipFill>
+          <a:blip r:embed="rId14" cstate="print">
+            <a:extLst>
+              <a:ext uri="{28A0092B-C50C-407E-A947-70E740481C1C}">
+                <a14:useLocalDpi xmlns:a14="http://schemas.microsoft.com/office/drawing/2010/main" val="0"/>
+              </a:ext>
+            </a:extLst>
+          </a:blip>
+          <a:srcRect/>
+          <a:stretch>
+            <a:fillRect/>
+          </a:stretch>
+        </p:blipFill>
+        <p:spPr bwMode="auto">
+          <a:xfrm>
+            <a:off x="44624" y="7020472"/>
+            <a:ext cx="2692562" cy="1800000"/>
+          </a:xfrm>
+          <a:prstGeom prst="rect">
+            <a:avLst/>
+          </a:prstGeom>
+          <a:noFill/>
+          <a:ln>
+            <a:noFill/>
+          </a:ln>
+          <a:effectLst/>
+          <a:extLst>
+            <a:ext uri="{909E8E84-426E-40DD-AFC4-6F175D3DCCD1}">
+              <a14:hiddenFill xmlns:a14="http://schemas.microsoft.com/office/drawing/2010/main">
+                <a:solidFill>
+                  <a:schemeClr val="accent1"/>
+                </a:solidFill>
+              </a14:hiddenFill>
+            </a:ext>
+            <a:ext uri="{91240B29-F687-4F45-9708-019B960494DF}">
+              <a14:hiddenLine xmlns:a14="http://schemas.microsoft.com/office/drawing/2010/main" w="9525">
+                <a:solidFill>
+                  <a:schemeClr val="tx1"/>
+                </a:solidFill>
+                <a:miter lim="800000"/>
+                <a:headEnd/>
+                <a:tailEnd/>
+              </a14:hiddenLine>
+            </a:ext>
+            <a:ext uri="{AF507438-7753-43E0-B8FC-AC1667EBCBE1}">
+              <a14:hiddenEffects xmlns:a14="http://schemas.microsoft.com/office/drawing/2010/main">
+                <a:effectLst>
+                  <a:outerShdw dist="35921" dir="2700000" algn="ctr" rotWithShape="0">
+                    <a:schemeClr val="bg2"/>
+                  </a:outerShdw>
+                </a:effectLst>
+              </a14:hiddenEffects>
+            </a:ext>
+          </a:extLst>
+        </p:spPr>
+      </p:pic>
+      <p:cxnSp>
+        <p:nvCxnSpPr>
+          <p:cNvPr id="53" name="Straight Arrow Connector 52"/>
+          <p:cNvCxnSpPr/>
+          <p:nvPr/>
+        </p:nvCxnSpPr>
+        <p:spPr>
+          <a:xfrm>
+            <a:off x="5301208" y="7385572"/>
+            <a:ext cx="360040" cy="714820"/>
+          </a:xfrm>
+          <a:prstGeom prst="straightConnector1">
+            <a:avLst/>
+          </a:prstGeom>
+          <a:ln w="25400">
+            <a:solidFill>
+              <a:srgbClr val="FF0000"/>
+            </a:solidFill>
+            <a:tailEnd type="arrow"/>
+          </a:ln>
+        </p:spPr>
+        <p:style>
+          <a:lnRef idx="1">
+            <a:schemeClr val="accent1"/>
+          </a:lnRef>
+          <a:fillRef idx="0">
+            <a:schemeClr val="accent1"/>
+          </a:fillRef>
+          <a:effectRef idx="0">
+            <a:schemeClr val="accent1"/>
+          </a:effectRef>
+          <a:fontRef idx="minor">
+            <a:schemeClr val="tx1"/>
+          </a:fontRef>
+        </p:style>
+      </p:cxnSp>
+      <p:sp>
+        <p:nvSpPr>
+          <p:cNvPr id="54" name="TextBox 53"/>
+          <p:cNvSpPr txBox="1"/>
+          <p:nvPr/>
+        </p:nvSpPr>
+        <p:spPr>
+          <a:xfrm>
+            <a:off x="2325144" y="6949541"/>
+            <a:ext cx="670376" cy="369332"/>
+          </a:xfrm>
+          <a:prstGeom prst="rect">
+            <a:avLst/>
+          </a:prstGeom>
+          <a:noFill/>
+        </p:spPr>
+        <p:txBody>
+          <a:bodyPr wrap="none" rtlCol="0">
+            <a:spAutoFit/>
+          </a:bodyPr>
+          <a:lstStyle/>
+          <a:p>
+            <a:r>
+              <a:rPr lang="en-GB" dirty="0" smtClean="0"/>
+              <a:t>Gap?</a:t>
+            </a:r>
+            <a:endParaRPr lang="en-GB" dirty="0"/>
+          </a:p>
+        </p:txBody>
+      </p:sp>
+      <p:cxnSp>
+        <p:nvCxnSpPr>
+          <p:cNvPr id="16" name="Straight Arrow Connector 15"/>
+          <p:cNvCxnSpPr/>
+          <p:nvPr/>
+        </p:nvCxnSpPr>
+        <p:spPr>
+          <a:xfrm flipH="1">
+            <a:off x="1412776" y="7200906"/>
+            <a:ext cx="989222" cy="315757"/>
+          </a:xfrm>
+          <a:prstGeom prst="straightConnector1">
+            <a:avLst/>
+          </a:prstGeom>
+          <a:ln>
+            <a:solidFill>
+              <a:srgbClr val="FF0000"/>
+            </a:solidFill>
+            <a:tailEnd type="arrow"/>
+          </a:ln>
+        </p:spPr>
+        <p:style>
+          <a:lnRef idx="1">
+            <a:schemeClr val="accent1"/>
+          </a:lnRef>
+          <a:fillRef idx="0">
+            <a:schemeClr val="accent1"/>
+          </a:fillRef>
+          <a:effectRef idx="0">
+            <a:schemeClr val="accent1"/>
+          </a:effectRef>
+          <a:fontRef idx="minor">
+            <a:schemeClr val="tx1"/>
+          </a:fontRef>
+        </p:style>
+      </p:cxnSp>
+      <p:cxnSp>
+        <p:nvCxnSpPr>
+          <p:cNvPr id="57" name="Straight Arrow Connector 56"/>
+          <p:cNvCxnSpPr>
+            <a:stCxn id="54" idx="1"/>
+          </p:cNvCxnSpPr>
+          <p:nvPr/>
+        </p:nvCxnSpPr>
+        <p:spPr>
+          <a:xfrm flipH="1">
+            <a:off x="1479938" y="7134207"/>
+            <a:ext cx="845206" cy="475822"/>
+          </a:xfrm>
+          <a:prstGeom prst="straightConnector1">
+            <a:avLst/>
+          </a:prstGeom>
+          <a:ln>
+            <a:solidFill>
+              <a:srgbClr val="FF0000"/>
+            </a:solidFill>
+            <a:tailEnd type="arrow"/>
+          </a:ln>
+        </p:spPr>
+        <p:style>
+          <a:lnRef idx="1">
+            <a:schemeClr val="accent1"/>
+          </a:lnRef>
+          <a:fillRef idx="0">
+            <a:schemeClr val="accent1"/>
+          </a:fillRef>
+          <a:effectRef idx="0">
+            <a:schemeClr val="accent1"/>
+          </a:effectRef>
+          <a:fontRef idx="minor">
+            <a:schemeClr val="tx1"/>
+          </a:fontRef>
+        </p:style>
+      </p:cxnSp>
+      <p:cxnSp>
+        <p:nvCxnSpPr>
+          <p:cNvPr id="2049" name="Straight Connector 2048"/>
+          <p:cNvCxnSpPr/>
+          <p:nvPr/>
+        </p:nvCxnSpPr>
+        <p:spPr>
+          <a:xfrm>
+            <a:off x="5161955" y="8264023"/>
+            <a:ext cx="1008112" cy="0"/>
+          </a:xfrm>
+          <a:prstGeom prst="line">
+            <a:avLst/>
+          </a:prstGeom>
+        </p:spPr>
+        <p:style>
+          <a:lnRef idx="1">
+            <a:schemeClr val="accent1"/>
+          </a:lnRef>
+          <a:fillRef idx="0">
+            <a:schemeClr val="accent1"/>
+          </a:fillRef>
+          <a:effectRef idx="0">
+            <a:schemeClr val="accent1"/>
+          </a:effectRef>
+          <a:fontRef idx="minor">
+            <a:schemeClr val="tx1"/>
+          </a:fontRef>
+        </p:style>
+      </p:cxnSp>
+      <p:cxnSp>
+        <p:nvCxnSpPr>
+          <p:cNvPr id="2064" name="Straight Connector 2063"/>
+          <p:cNvCxnSpPr/>
+          <p:nvPr/>
+        </p:nvCxnSpPr>
+        <p:spPr>
+          <a:xfrm>
+            <a:off x="5831932" y="7092280"/>
+            <a:ext cx="0" cy="1449686"/>
+          </a:xfrm>
+          <a:prstGeom prst="line">
+            <a:avLst/>
+          </a:prstGeom>
+        </p:spPr>
+        <p:style>
+          <a:lnRef idx="1">
+            <a:schemeClr val="accent1"/>
+          </a:lnRef>
+          <a:fillRef idx="0">
+            <a:schemeClr val="accent1"/>
+          </a:fillRef>
+          <a:effectRef idx="0">
+            <a:schemeClr val="accent1"/>
+          </a:effectRef>
+          <a:fontRef idx="minor">
+            <a:schemeClr val="tx1"/>
+          </a:fontRef>
+        </p:style>
+      </p:cxnSp>
+      <p:cxnSp>
+        <p:nvCxnSpPr>
+          <p:cNvPr id="72" name="Straight Connector 71"/>
+          <p:cNvCxnSpPr/>
+          <p:nvPr/>
+        </p:nvCxnSpPr>
+        <p:spPr>
+          <a:xfrm>
+            <a:off x="5511906" y="7092280"/>
+            <a:ext cx="0" cy="1449686"/>
+          </a:xfrm>
+          <a:prstGeom prst="line">
+            <a:avLst/>
+          </a:prstGeom>
+        </p:spPr>
+        <p:style>
+          <a:lnRef idx="1">
+            <a:schemeClr val="accent1"/>
+          </a:lnRef>
+          <a:fillRef idx="0">
+            <a:schemeClr val="accent1"/>
+          </a:fillRef>
+          <a:effectRef idx="0">
+            <a:schemeClr val="accent1"/>
+          </a:effectRef>
+          <a:fontRef idx="minor">
+            <a:schemeClr val="tx1"/>
+          </a:fontRef>
+        </p:style>
+      </p:cxnSp>
+      <p:cxnSp>
+        <p:nvCxnSpPr>
+          <p:cNvPr id="73" name="Straight Connector 72"/>
+          <p:cNvCxnSpPr/>
+          <p:nvPr/>
+        </p:nvCxnSpPr>
+        <p:spPr>
+          <a:xfrm>
+            <a:off x="5181007" y="7971228"/>
+            <a:ext cx="1008112" cy="0"/>
+          </a:xfrm>
+          <a:prstGeom prst="line">
+            <a:avLst/>
+          </a:prstGeom>
+        </p:spPr>
+        <p:style>
+          <a:lnRef idx="1">
+            <a:schemeClr val="accent1"/>
+          </a:lnRef>
+          <a:fillRef idx="0">
+            <a:schemeClr val="accent1"/>
+          </a:fillRef>
+          <a:effectRef idx="0">
+            <a:schemeClr val="accent1"/>
+          </a:effectRef>
+          <a:fontRef idx="minor">
+            <a:schemeClr val="tx1"/>
+          </a:fontRef>
+        </p:style>
+      </p:cxnSp>
+      <p:cxnSp>
+        <p:nvCxnSpPr>
+          <p:cNvPr id="74" name="Straight Connector 73"/>
+          <p:cNvCxnSpPr/>
+          <p:nvPr/>
+        </p:nvCxnSpPr>
+        <p:spPr>
+          <a:xfrm>
+            <a:off x="5185770" y="7682633"/>
+            <a:ext cx="1008112" cy="0"/>
+          </a:xfrm>
+          <a:prstGeom prst="line">
+            <a:avLst/>
+          </a:prstGeom>
+        </p:spPr>
+        <p:style>
+          <a:lnRef idx="1">
+            <a:schemeClr val="accent1"/>
+          </a:lnRef>
+          <a:fillRef idx="0">
+            <a:schemeClr val="accent1"/>
+          </a:fillRef>
+          <a:effectRef idx="0">
+            <a:schemeClr val="accent1"/>
+          </a:effectRef>
+          <a:fontRef idx="minor">
+            <a:schemeClr val="tx1"/>
+          </a:fontRef>
+        </p:style>
+      </p:cxnSp>
+      <p:cxnSp>
+        <p:nvCxnSpPr>
+          <p:cNvPr id="75" name="Straight Connector 74"/>
+          <p:cNvCxnSpPr/>
+          <p:nvPr/>
+        </p:nvCxnSpPr>
+        <p:spPr>
+          <a:xfrm>
+            <a:off x="5195296" y="7394038"/>
+            <a:ext cx="1008112" cy="0"/>
+          </a:xfrm>
+          <a:prstGeom prst="line">
+            <a:avLst/>
+          </a:prstGeom>
+        </p:spPr>
+        <p:style>
+          <a:lnRef idx="1">
+            <a:schemeClr val="accent1"/>
+          </a:lnRef>
+          <a:fillRef idx="0">
+            <a:schemeClr val="accent1"/>
+          </a:fillRef>
+          <a:effectRef idx="0">
+            <a:schemeClr val="accent1"/>
+          </a:effectRef>
+          <a:fontRef idx="minor">
+            <a:schemeClr val="tx1"/>
+          </a:fontRef>
+        </p:style>
+      </p:cxnSp>
+      <p:sp>
+        <p:nvSpPr>
+          <p:cNvPr id="2068" name="Oval 2067"/>
+          <p:cNvSpPr/>
+          <p:nvPr/>
+        </p:nvSpPr>
+        <p:spPr>
+          <a:xfrm>
+            <a:off x="5490565" y="7375549"/>
+            <a:ext cx="45719" cy="45719"/>
+          </a:xfrm>
+          <a:prstGeom prst="ellipse">
+            <a:avLst/>
+          </a:prstGeom>
+          <a:solidFill>
+            <a:schemeClr val="tx1"/>
+          </a:solidFill>
+          <a:ln>
+            <a:noFill/>
+          </a:ln>
+        </p:spPr>
+        <p:style>
+          <a:lnRef idx="2">
+            <a:schemeClr val="accent1">
+              <a:shade val="50000"/>
+            </a:schemeClr>
+          </a:lnRef>
+          <a:fillRef idx="1">
+            <a:schemeClr val="accent1"/>
+          </a:fillRef>
+          <a:effectRef idx="0">
+            <a:schemeClr val="accent1"/>
+          </a:effectRef>
+          <a:fontRef idx="minor">
+            <a:schemeClr val="lt1"/>
+          </a:fontRef>
+        </p:style>
+        <p:txBody>
+          <a:bodyPr rtlCol="0" anchor="ctr"/>
+          <a:lstStyle/>
+          <a:p>
+            <a:pPr algn="ctr"/>
+            <a:endParaRPr lang="en-GB"/>
+          </a:p>
+        </p:txBody>
+      </p:sp>
+      <p:sp>
+        <p:nvSpPr>
+          <p:cNvPr id="78" name="Oval 77"/>
+          <p:cNvSpPr/>
+          <p:nvPr/>
+        </p:nvSpPr>
+        <p:spPr>
+          <a:xfrm>
+            <a:off x="5814790" y="7658818"/>
+            <a:ext cx="45719" cy="45719"/>
+          </a:xfrm>
+          <a:prstGeom prst="ellipse">
+            <a:avLst/>
+          </a:prstGeom>
+          <a:solidFill>
+            <a:schemeClr val="tx1"/>
+          </a:solidFill>
+          <a:ln>
+            <a:noFill/>
+          </a:ln>
+        </p:spPr>
+        <p:style>
+          <a:lnRef idx="2">
+            <a:schemeClr val="accent1">
+              <a:shade val="50000"/>
+            </a:schemeClr>
+          </a:lnRef>
+          <a:fillRef idx="1">
+            <a:schemeClr val="accent1"/>
+          </a:fillRef>
+          <a:effectRef idx="0">
+            <a:schemeClr val="accent1"/>
+          </a:effectRef>
+          <a:fontRef idx="minor">
+            <a:schemeClr val="lt1"/>
+          </a:fontRef>
+        </p:style>
+        <p:txBody>
+          <a:bodyPr rtlCol="0" anchor="ctr"/>
+          <a:lstStyle/>
+          <a:p>
+            <a:pPr algn="ctr"/>
+            <a:endParaRPr lang="en-GB"/>
+          </a:p>
+        </p:txBody>
+      </p:sp>
+      <p:sp>
+        <p:nvSpPr>
+          <p:cNvPr id="79" name="Oval 78"/>
+          <p:cNvSpPr/>
+          <p:nvPr/>
+        </p:nvSpPr>
+        <p:spPr>
+          <a:xfrm>
+            <a:off x="6148541" y="7942087"/>
+            <a:ext cx="45719" cy="45719"/>
+          </a:xfrm>
+          <a:prstGeom prst="ellipse">
+            <a:avLst/>
+          </a:prstGeom>
+          <a:solidFill>
+            <a:schemeClr val="tx1"/>
+          </a:solidFill>
+          <a:ln>
+            <a:noFill/>
+          </a:ln>
+        </p:spPr>
+        <p:style>
+          <a:lnRef idx="2">
+            <a:schemeClr val="accent1">
+              <a:shade val="50000"/>
+            </a:schemeClr>
+          </a:lnRef>
+          <a:fillRef idx="1">
+            <a:schemeClr val="accent1"/>
+          </a:fillRef>
+          <a:effectRef idx="0">
+            <a:schemeClr val="accent1"/>
+          </a:effectRef>
+          <a:fontRef idx="minor">
+            <a:schemeClr val="lt1"/>
+          </a:fontRef>
+        </p:style>
+        <p:txBody>
+          <a:bodyPr rtlCol="0" anchor="ctr"/>
+          <a:lstStyle/>
+          <a:p>
+            <a:pPr algn="ctr"/>
+            <a:endParaRPr lang="en-GB"/>
+          </a:p>
+        </p:txBody>
+      </p:sp>
+      <p:sp>
+        <p:nvSpPr>
+          <p:cNvPr id="80" name="Oval 79"/>
+          <p:cNvSpPr/>
+          <p:nvPr/>
+        </p:nvSpPr>
+        <p:spPr>
+          <a:xfrm>
+            <a:off x="5815472" y="8230119"/>
+            <a:ext cx="45719" cy="45719"/>
+          </a:xfrm>
+          <a:prstGeom prst="ellipse">
+            <a:avLst/>
+          </a:prstGeom>
+          <a:solidFill>
+            <a:schemeClr val="tx1"/>
+          </a:solidFill>
+          <a:ln>
+            <a:noFill/>
+          </a:ln>
+        </p:spPr>
+        <p:style>
+          <a:lnRef idx="2">
+            <a:schemeClr val="accent1">
+              <a:shade val="50000"/>
+            </a:schemeClr>
+          </a:lnRef>
+          <a:fillRef idx="1">
+            <a:schemeClr val="accent1"/>
+          </a:fillRef>
+          <a:effectRef idx="0">
+            <a:schemeClr val="accent1"/>
+          </a:effectRef>
+          <a:fontRef idx="minor">
+            <a:schemeClr val="lt1"/>
+          </a:fontRef>
+        </p:style>
+        <p:txBody>
+          <a:bodyPr rtlCol="0" anchor="ctr"/>
+          <a:lstStyle/>
+          <a:p>
+            <a:pPr algn="ctr"/>
+            <a:endParaRPr lang="en-GB"/>
+          </a:p>
+        </p:txBody>
+      </p:sp>
+      <p:sp>
+        <p:nvSpPr>
+          <p:cNvPr id="81" name="Oval 80"/>
+          <p:cNvSpPr/>
+          <p:nvPr/>
+        </p:nvSpPr>
+        <p:spPr>
+          <a:xfrm>
+            <a:off x="5482403" y="7946591"/>
+            <a:ext cx="45719" cy="45719"/>
+          </a:xfrm>
+          <a:prstGeom prst="ellipse">
+            <a:avLst/>
+          </a:prstGeom>
+          <a:solidFill>
+            <a:schemeClr val="tx1"/>
+          </a:solidFill>
+          <a:ln>
+            <a:noFill/>
+          </a:ln>
+        </p:spPr>
+        <p:style>
+          <a:lnRef idx="2">
+            <a:schemeClr val="accent1">
+              <a:shade val="50000"/>
+            </a:schemeClr>
+          </a:lnRef>
+          <a:fillRef idx="1">
+            <a:schemeClr val="accent1"/>
+          </a:fillRef>
+          <a:effectRef idx="0">
+            <a:schemeClr val="accent1"/>
+          </a:effectRef>
+          <a:fontRef idx="minor">
+            <a:schemeClr val="lt1"/>
+          </a:fontRef>
+        </p:style>
+        <p:txBody>
+          <a:bodyPr rtlCol="0" anchor="ctr"/>
+          <a:lstStyle/>
+          <a:p>
+            <a:pPr algn="ctr"/>
+            <a:endParaRPr lang="en-GB"/>
+          </a:p>
+        </p:txBody>
+      </p:sp>
+      <p:sp>
+        <p:nvSpPr>
+          <p:cNvPr id="77" name="Oval 76"/>
+          <p:cNvSpPr/>
+          <p:nvPr/>
+        </p:nvSpPr>
+        <p:spPr>
+          <a:xfrm>
+            <a:off x="5811938" y="7370223"/>
+            <a:ext cx="45719" cy="45719"/>
+          </a:xfrm>
+          <a:prstGeom prst="ellipse">
+            <a:avLst/>
+          </a:prstGeom>
+          <a:noFill/>
+          <a:ln w="6350">
+            <a:solidFill>
+              <a:schemeClr val="tx1"/>
+            </a:solidFill>
+          </a:ln>
+        </p:spPr>
+        <p:style>
+          <a:lnRef idx="2">
+            <a:schemeClr val="accent1">
+              <a:shade val="50000"/>
+            </a:schemeClr>
+          </a:lnRef>
+          <a:fillRef idx="1">
+            <a:schemeClr val="accent1"/>
+          </a:fillRef>
+          <a:effectRef idx="0">
+            <a:schemeClr val="accent1"/>
+          </a:effectRef>
+          <a:fontRef idx="minor">
+            <a:schemeClr val="lt1"/>
+          </a:fontRef>
+        </p:style>
+        <p:txBody>
+          <a:bodyPr rtlCol="0" anchor="ctr"/>
+          <a:lstStyle/>
+          <a:p>
+            <a:pPr algn="ctr"/>
+            <a:endParaRPr lang="en-GB"/>
+          </a:p>
+        </p:txBody>
+      </p:sp>
+      <p:sp>
+        <p:nvSpPr>
+          <p:cNvPr id="82" name="Oval 81"/>
+          <p:cNvSpPr/>
+          <p:nvPr/>
+        </p:nvSpPr>
+        <p:spPr>
+          <a:xfrm>
+            <a:off x="5814227" y="7949324"/>
+            <a:ext cx="45719" cy="45719"/>
+          </a:xfrm>
+          <a:prstGeom prst="ellipse">
+            <a:avLst/>
+          </a:prstGeom>
+          <a:noFill/>
+          <a:ln w="6350">
+            <a:solidFill>
+              <a:schemeClr val="tx1"/>
+            </a:solidFill>
+          </a:ln>
+        </p:spPr>
+        <p:style>
+          <a:lnRef idx="2">
+            <a:schemeClr val="accent1">
+              <a:shade val="50000"/>
+            </a:schemeClr>
+          </a:lnRef>
+          <a:fillRef idx="1">
+            <a:schemeClr val="accent1"/>
+          </a:fillRef>
+          <a:effectRef idx="0">
+            <a:schemeClr val="accent1"/>
+          </a:effectRef>
+          <a:fontRef idx="minor">
+            <a:schemeClr val="lt1"/>
+          </a:fontRef>
+        </p:style>
+        <p:txBody>
+          <a:bodyPr rtlCol="0" anchor="ctr"/>
+          <a:lstStyle/>
+          <a:p>
+            <a:pPr algn="ctr"/>
+            <a:endParaRPr lang="en-GB"/>
           </a:p>
         </p:txBody>
       </p:sp>

</xml_diff>

<commit_message>
tried background removal and starting to plot dispersion
Former-commit-id: 339b57c49cf8eaa10d1b973701ec0193c3715e04
</commit_message>
<xml_diff>
--- a/Jan2015/Summary2015.pptx
+++ b/Jan2015/Summary2015.pptx
@@ -291,7 +291,7 @@
           <a:p>
             <a:fld id="{103F0B6B-0F34-4B60-AA46-B717113E1AE3}" type="datetimeFigureOut">
               <a:rPr lang="en-GB" smtClean="0"/>
-              <a:t>02/01/2015</a:t>
+              <a:t>06/01/2015</a:t>
             </a:fld>
             <a:endParaRPr lang="en-GB"/>
           </a:p>
@@ -461,7 +461,7 @@
           <a:p>
             <a:fld id="{103F0B6B-0F34-4B60-AA46-B717113E1AE3}" type="datetimeFigureOut">
               <a:rPr lang="en-GB" smtClean="0"/>
-              <a:t>02/01/2015</a:t>
+              <a:t>06/01/2015</a:t>
             </a:fld>
             <a:endParaRPr lang="en-GB"/>
           </a:p>
@@ -641,7 +641,7 @@
           <a:p>
             <a:fld id="{103F0B6B-0F34-4B60-AA46-B717113E1AE3}" type="datetimeFigureOut">
               <a:rPr lang="en-GB" smtClean="0"/>
-              <a:t>02/01/2015</a:t>
+              <a:t>06/01/2015</a:t>
             </a:fld>
             <a:endParaRPr lang="en-GB"/>
           </a:p>
@@ -811,7 +811,7 @@
           <a:p>
             <a:fld id="{103F0B6B-0F34-4B60-AA46-B717113E1AE3}" type="datetimeFigureOut">
               <a:rPr lang="en-GB" smtClean="0"/>
-              <a:t>02/01/2015</a:t>
+              <a:t>06/01/2015</a:t>
             </a:fld>
             <a:endParaRPr lang="en-GB"/>
           </a:p>
@@ -1057,7 +1057,7 @@
           <a:p>
             <a:fld id="{103F0B6B-0F34-4B60-AA46-B717113E1AE3}" type="datetimeFigureOut">
               <a:rPr lang="en-GB" smtClean="0"/>
-              <a:t>02/01/2015</a:t>
+              <a:t>06/01/2015</a:t>
             </a:fld>
             <a:endParaRPr lang="en-GB"/>
           </a:p>
@@ -1345,7 +1345,7 @@
           <a:p>
             <a:fld id="{103F0B6B-0F34-4B60-AA46-B717113E1AE3}" type="datetimeFigureOut">
               <a:rPr lang="en-GB" smtClean="0"/>
-              <a:t>02/01/2015</a:t>
+              <a:t>06/01/2015</a:t>
             </a:fld>
             <a:endParaRPr lang="en-GB"/>
           </a:p>
@@ -1767,7 +1767,7 @@
           <a:p>
             <a:fld id="{103F0B6B-0F34-4B60-AA46-B717113E1AE3}" type="datetimeFigureOut">
               <a:rPr lang="en-GB" smtClean="0"/>
-              <a:t>02/01/2015</a:t>
+              <a:t>06/01/2015</a:t>
             </a:fld>
             <a:endParaRPr lang="en-GB"/>
           </a:p>
@@ -1885,7 +1885,7 @@
           <a:p>
             <a:fld id="{103F0B6B-0F34-4B60-AA46-B717113E1AE3}" type="datetimeFigureOut">
               <a:rPr lang="en-GB" smtClean="0"/>
-              <a:t>02/01/2015</a:t>
+              <a:t>06/01/2015</a:t>
             </a:fld>
             <a:endParaRPr lang="en-GB"/>
           </a:p>
@@ -1980,7 +1980,7 @@
           <a:p>
             <a:fld id="{103F0B6B-0F34-4B60-AA46-B717113E1AE3}" type="datetimeFigureOut">
               <a:rPr lang="en-GB" smtClean="0"/>
-              <a:t>02/01/2015</a:t>
+              <a:t>06/01/2015</a:t>
             </a:fld>
             <a:endParaRPr lang="en-GB"/>
           </a:p>
@@ -2257,7 +2257,7 @@
           <a:p>
             <a:fld id="{103F0B6B-0F34-4B60-AA46-B717113E1AE3}" type="datetimeFigureOut">
               <a:rPr lang="en-GB" smtClean="0"/>
-              <a:t>02/01/2015</a:t>
+              <a:t>06/01/2015</a:t>
             </a:fld>
             <a:endParaRPr lang="en-GB"/>
           </a:p>
@@ -2510,7 +2510,7 @@
           <a:p>
             <a:fld id="{103F0B6B-0F34-4B60-AA46-B717113E1AE3}" type="datetimeFigureOut">
               <a:rPr lang="en-GB" smtClean="0"/>
-              <a:t>02/01/2015</a:t>
+              <a:t>06/01/2015</a:t>
             </a:fld>
             <a:endParaRPr lang="en-GB"/>
           </a:p>
@@ -2723,7 +2723,7 @@
           <a:p>
             <a:fld id="{103F0B6B-0F34-4B60-AA46-B717113E1AE3}" type="datetimeFigureOut">
               <a:rPr lang="en-GB" smtClean="0"/>
-              <a:t>02/01/2015</a:t>
+              <a:t>06/01/2015</a:t>
             </a:fld>
             <a:endParaRPr lang="en-GB"/>
           </a:p>
@@ -6975,7 +6975,7 @@
       </p:grpSpPr>
       <p:pic>
         <p:nvPicPr>
-          <p:cNvPr id="1026" name="Picture 2"/>
+          <p:cNvPr id="1039" name="Picture 15"/>
           <p:cNvPicPr>
             <a:picLocks noChangeAspect="1" noChangeArrowheads="1"/>
           </p:cNvPicPr>
@@ -6996,7 +6996,7 @@
         </p:blipFill>
         <p:spPr bwMode="auto">
           <a:xfrm>
-            <a:off x="-724" y="467544"/>
+            <a:off x="3296894" y="3347864"/>
             <a:ext cx="1920397" cy="1440000"/>
           </a:xfrm>
           <a:prstGeom prst="rect">
@@ -7039,7 +7039,7 @@
       </p:pic>
       <p:pic>
         <p:nvPicPr>
-          <p:cNvPr id="1027" name="Picture 3"/>
+          <p:cNvPr id="1045" name="Picture 21"/>
           <p:cNvPicPr>
             <a:picLocks noChangeAspect="1" noChangeArrowheads="1"/>
           </p:cNvPicPr>
@@ -7060,8 +7060,8 @@
         </p:blipFill>
         <p:spPr bwMode="auto">
           <a:xfrm>
-            <a:off x="3670" y="1907864"/>
-            <a:ext cx="1924374" cy="1440000"/>
+            <a:off x="4941168" y="3420032"/>
+            <a:ext cx="1920397" cy="1440000"/>
           </a:xfrm>
           <a:prstGeom prst="rect">
             <a:avLst/>
@@ -7103,7 +7103,7 @@
       </p:pic>
       <p:pic>
         <p:nvPicPr>
-          <p:cNvPr id="1028" name="Picture 4"/>
+          <p:cNvPr id="1026" name="Picture 2"/>
           <p:cNvPicPr>
             <a:picLocks noChangeAspect="1" noChangeArrowheads="1"/>
           </p:cNvPicPr>
@@ -7124,7 +7124,7 @@
         </p:blipFill>
         <p:spPr bwMode="auto">
           <a:xfrm>
-            <a:off x="5659" y="4788184"/>
+            <a:off x="25285" y="467864"/>
             <a:ext cx="1920397" cy="1440000"/>
           </a:xfrm>
           <a:prstGeom prst="rect">
@@ -7167,7 +7167,7 @@
       </p:pic>
       <p:pic>
         <p:nvPicPr>
-          <p:cNvPr id="1029" name="Picture 5"/>
+          <p:cNvPr id="1027" name="Picture 3"/>
           <p:cNvPicPr>
             <a:picLocks noChangeAspect="1" noChangeArrowheads="1"/>
           </p:cNvPicPr>
@@ -7188,8 +7188,8 @@
         </p:blipFill>
         <p:spPr bwMode="auto">
           <a:xfrm>
-            <a:off x="5659" y="3348024"/>
-            <a:ext cx="1920397" cy="1440000"/>
+            <a:off x="3670" y="1907864"/>
+            <a:ext cx="1924374" cy="1440000"/>
           </a:xfrm>
           <a:prstGeom prst="rect">
             <a:avLst/>
@@ -7231,7 +7231,7 @@
       </p:pic>
       <p:pic>
         <p:nvPicPr>
-          <p:cNvPr id="1030" name="Picture 6"/>
+          <p:cNvPr id="1028" name="Picture 4"/>
           <p:cNvPicPr>
             <a:picLocks noChangeAspect="1" noChangeArrowheads="1"/>
           </p:cNvPicPr>
@@ -7252,7 +7252,7 @@
         </p:blipFill>
         <p:spPr bwMode="auto">
           <a:xfrm>
-            <a:off x="1628800" y="467544"/>
+            <a:off x="5659" y="4788184"/>
             <a:ext cx="1920397" cy="1440000"/>
           </a:xfrm>
           <a:prstGeom prst="rect">
@@ -7295,7 +7295,7 @@
       </p:pic>
       <p:pic>
         <p:nvPicPr>
-          <p:cNvPr id="1031" name="Picture 7"/>
+          <p:cNvPr id="1029" name="Picture 5"/>
           <p:cNvPicPr>
             <a:picLocks noChangeAspect="1" noChangeArrowheads="1"/>
           </p:cNvPicPr>
@@ -7316,7 +7316,7 @@
         </p:blipFill>
         <p:spPr bwMode="auto">
           <a:xfrm>
-            <a:off x="1628800" y="1907864"/>
+            <a:off x="5659" y="3348024"/>
             <a:ext cx="1920397" cy="1440000"/>
           </a:xfrm>
           <a:prstGeom prst="rect">
@@ -7359,7 +7359,7 @@
       </p:pic>
       <p:pic>
         <p:nvPicPr>
-          <p:cNvPr id="1032" name="Picture 8"/>
+          <p:cNvPr id="1030" name="Picture 6"/>
           <p:cNvPicPr>
             <a:picLocks noChangeAspect="1" noChangeArrowheads="1"/>
           </p:cNvPicPr>
@@ -7380,7 +7380,7 @@
         </p:blipFill>
         <p:spPr bwMode="auto">
           <a:xfrm>
-            <a:off x="1628800" y="3325788"/>
+            <a:off x="1628800" y="467544"/>
             <a:ext cx="1920397" cy="1440000"/>
           </a:xfrm>
           <a:prstGeom prst="rect">
@@ -7423,7 +7423,7 @@
       </p:pic>
       <p:pic>
         <p:nvPicPr>
-          <p:cNvPr id="1033" name="Picture 9"/>
+          <p:cNvPr id="1031" name="Picture 7"/>
           <p:cNvPicPr>
             <a:picLocks noChangeAspect="1" noChangeArrowheads="1"/>
           </p:cNvPicPr>
@@ -7444,7 +7444,7 @@
         </p:blipFill>
         <p:spPr bwMode="auto">
           <a:xfrm>
-            <a:off x="1628800" y="4788184"/>
+            <a:off x="1628800" y="1907864"/>
             <a:ext cx="1920397" cy="1440000"/>
           </a:xfrm>
           <a:prstGeom prst="rect">
@@ -7487,7 +7487,7 @@
       </p:pic>
       <p:pic>
         <p:nvPicPr>
-          <p:cNvPr id="1034" name="Picture 10"/>
+          <p:cNvPr id="1032" name="Picture 8"/>
           <p:cNvPicPr>
             <a:picLocks noChangeAspect="1" noChangeArrowheads="1"/>
           </p:cNvPicPr>
@@ -7508,7 +7508,7 @@
         </p:blipFill>
         <p:spPr bwMode="auto">
           <a:xfrm>
-            <a:off x="1628800" y="6228344"/>
+            <a:off x="1628800" y="3325788"/>
             <a:ext cx="1920397" cy="1440000"/>
           </a:xfrm>
           <a:prstGeom prst="rect">
@@ -7549,6 +7549,134 @@
           </a:extLst>
         </p:spPr>
       </p:pic>
+      <p:pic>
+        <p:nvPicPr>
+          <p:cNvPr id="1033" name="Picture 9"/>
+          <p:cNvPicPr>
+            <a:picLocks noChangeAspect="1" noChangeArrowheads="1"/>
+          </p:cNvPicPr>
+          <p:nvPr/>
+        </p:nvPicPr>
+        <p:blipFill>
+          <a:blip r:embed="rId11" cstate="print">
+            <a:extLst>
+              <a:ext uri="{28A0092B-C50C-407E-A947-70E740481C1C}">
+                <a14:useLocalDpi xmlns:a14="http://schemas.microsoft.com/office/drawing/2010/main" val="0"/>
+              </a:ext>
+            </a:extLst>
+          </a:blip>
+          <a:srcRect/>
+          <a:stretch>
+            <a:fillRect/>
+          </a:stretch>
+        </p:blipFill>
+        <p:spPr bwMode="auto">
+          <a:xfrm>
+            <a:off x="1628800" y="4788184"/>
+            <a:ext cx="1920397" cy="1440000"/>
+          </a:xfrm>
+          <a:prstGeom prst="rect">
+            <a:avLst/>
+          </a:prstGeom>
+          <a:noFill/>
+          <a:ln>
+            <a:noFill/>
+          </a:ln>
+          <a:effectLst/>
+          <a:extLst>
+            <a:ext uri="{909E8E84-426E-40DD-AFC4-6F175D3DCCD1}">
+              <a14:hiddenFill xmlns:a14="http://schemas.microsoft.com/office/drawing/2010/main">
+                <a:solidFill>
+                  <a:schemeClr val="accent1"/>
+                </a:solidFill>
+              </a14:hiddenFill>
+            </a:ext>
+            <a:ext uri="{91240B29-F687-4F45-9708-019B960494DF}">
+              <a14:hiddenLine xmlns:a14="http://schemas.microsoft.com/office/drawing/2010/main" w="9525">
+                <a:solidFill>
+                  <a:schemeClr val="tx1"/>
+                </a:solidFill>
+                <a:miter lim="800000"/>
+                <a:headEnd/>
+                <a:tailEnd/>
+              </a14:hiddenLine>
+            </a:ext>
+            <a:ext uri="{AF507438-7753-43E0-B8FC-AC1667EBCBE1}">
+              <a14:hiddenEffects xmlns:a14="http://schemas.microsoft.com/office/drawing/2010/main">
+                <a:effectLst>
+                  <a:outerShdw dist="35921" dir="2700000" algn="ctr" rotWithShape="0">
+                    <a:schemeClr val="bg2"/>
+                  </a:outerShdw>
+                </a:effectLst>
+              </a14:hiddenEffects>
+            </a:ext>
+          </a:extLst>
+        </p:spPr>
+      </p:pic>
+      <p:pic>
+        <p:nvPicPr>
+          <p:cNvPr id="1034" name="Picture 10"/>
+          <p:cNvPicPr>
+            <a:picLocks noChangeAspect="1" noChangeArrowheads="1"/>
+          </p:cNvPicPr>
+          <p:nvPr/>
+        </p:nvPicPr>
+        <p:blipFill>
+          <a:blip r:embed="rId12" cstate="print">
+            <a:extLst>
+              <a:ext uri="{28A0092B-C50C-407E-A947-70E740481C1C}">
+                <a14:useLocalDpi xmlns:a14="http://schemas.microsoft.com/office/drawing/2010/main" val="0"/>
+              </a:ext>
+            </a:extLst>
+          </a:blip>
+          <a:srcRect/>
+          <a:stretch>
+            <a:fillRect/>
+          </a:stretch>
+        </p:blipFill>
+        <p:spPr bwMode="auto">
+          <a:xfrm>
+            <a:off x="1628800" y="6228344"/>
+            <a:ext cx="1920397" cy="1440000"/>
+          </a:xfrm>
+          <a:prstGeom prst="rect">
+            <a:avLst/>
+          </a:prstGeom>
+          <a:noFill/>
+          <a:ln>
+            <a:noFill/>
+          </a:ln>
+          <a:effectLst/>
+          <a:extLst>
+            <a:ext uri="{909E8E84-426E-40DD-AFC4-6F175D3DCCD1}">
+              <a14:hiddenFill xmlns:a14="http://schemas.microsoft.com/office/drawing/2010/main">
+                <a:solidFill>
+                  <a:schemeClr val="accent1"/>
+                </a:solidFill>
+              </a14:hiddenFill>
+            </a:ext>
+            <a:ext uri="{91240B29-F687-4F45-9708-019B960494DF}">
+              <a14:hiddenLine xmlns:a14="http://schemas.microsoft.com/office/drawing/2010/main" w="9525">
+                <a:solidFill>
+                  <a:schemeClr val="tx1"/>
+                </a:solidFill>
+                <a:miter lim="800000"/>
+                <a:headEnd/>
+                <a:tailEnd/>
+              </a14:hiddenLine>
+            </a:ext>
+            <a:ext uri="{AF507438-7753-43E0-B8FC-AC1667EBCBE1}">
+              <a14:hiddenEffects xmlns:a14="http://schemas.microsoft.com/office/drawing/2010/main">
+                <a:effectLst>
+                  <a:outerShdw dist="35921" dir="2700000" algn="ctr" rotWithShape="0">
+                    <a:schemeClr val="bg2"/>
+                  </a:outerShdw>
+                </a:effectLst>
+              </a14:hiddenEffects>
+            </a:ext>
+          </a:extLst>
+        </p:spPr>
+      </p:pic>
       <p:sp>
         <p:nvSpPr>
           <p:cNvPr id="2" name="Title 1"/>
@@ -7561,7 +7689,7 @@
         </p:nvSpPr>
         <p:spPr>
           <a:xfrm>
-            <a:off x="188640" y="-108520"/>
+            <a:off x="869097" y="-199524"/>
             <a:ext cx="6172200" cy="667068"/>
           </a:xfrm>
         </p:spPr>
@@ -7635,7 +7763,7 @@
                   <a:schemeClr val="tx1"/>
                 </a:solidFill>
               </a:rPr>
-              <a:t>Ei</a:t>
+              <a:t>dE</a:t>
             </a:r>
             <a:r>
               <a:rPr lang="en-GB" sz="1400" dirty="0" smtClean="0">
@@ -7661,7 +7789,7 @@
         </p:nvSpPr>
         <p:spPr>
           <a:xfrm>
-            <a:off x="1988840" y="467544"/>
+            <a:off x="1977410" y="394450"/>
             <a:ext cx="1008112" cy="288032"/>
           </a:xfrm>
           <a:prstGeom prst="rect">
@@ -7701,7 +7829,7 @@
                   <a:schemeClr val="tx1"/>
                 </a:solidFill>
               </a:rPr>
-              <a:t>Ei</a:t>
+              <a:t>dE</a:t>
             </a:r>
             <a:r>
               <a:rPr lang="en-GB" sz="1400" dirty="0" smtClean="0">
@@ -7767,7 +7895,7 @@
                   <a:schemeClr val="tx1"/>
                 </a:solidFill>
               </a:rPr>
-              <a:t>Ei</a:t>
+              <a:t>dE</a:t>
             </a:r>
             <a:r>
               <a:rPr lang="en-GB" sz="1400" dirty="0" smtClean="0">
@@ -7833,7 +7961,7 @@
                   <a:schemeClr val="tx1"/>
                 </a:solidFill>
               </a:rPr>
-              <a:t>Ei</a:t>
+              <a:t>dE</a:t>
             </a:r>
             <a:r>
               <a:rPr lang="en-GB" sz="1400" dirty="0" smtClean="0">
@@ -7899,7 +8027,7 @@
                   <a:schemeClr val="tx1"/>
                 </a:solidFill>
               </a:rPr>
-              <a:t>Ei</a:t>
+              <a:t>dE</a:t>
             </a:r>
             <a:r>
               <a:rPr lang="en-GB" sz="1400" dirty="0" smtClean="0">
@@ -7965,7 +8093,7 @@
                   <a:schemeClr val="tx1"/>
                 </a:solidFill>
               </a:rPr>
-              <a:t>Ei</a:t>
+              <a:t>dE</a:t>
             </a:r>
             <a:r>
               <a:rPr lang="en-GB" sz="1400" dirty="0" smtClean="0">
@@ -8031,7 +8159,7 @@
                   <a:schemeClr val="tx1"/>
                 </a:solidFill>
               </a:rPr>
-              <a:t>Ei</a:t>
+              <a:t>dE</a:t>
             </a:r>
             <a:r>
               <a:rPr lang="en-GB" sz="1400" dirty="0" smtClean="0">
@@ -8097,7 +8225,7 @@
                   <a:schemeClr val="tx1"/>
                 </a:solidFill>
               </a:rPr>
-              <a:t>Ei</a:t>
+              <a:t>dE</a:t>
             </a:r>
             <a:r>
               <a:rPr lang="en-GB" sz="1400" dirty="0" smtClean="0">
@@ -8163,7 +8291,7 @@
                   <a:schemeClr val="tx1"/>
                 </a:solidFill>
               </a:rPr>
-              <a:t>Ei</a:t>
+              <a:t>dE</a:t>
             </a:r>
             <a:r>
               <a:rPr lang="en-GB" sz="1400" dirty="0" smtClean="0">
@@ -9884,7 +10012,7 @@
             <p:nvPr/>
           </p:nvPicPr>
           <p:blipFill>
-            <a:blip r:embed="rId11" cstate="print">
+            <a:blip r:embed="rId13" cstate="print">
               <a:extLst>
                 <a:ext uri="{28A0092B-C50C-407E-A947-70E740481C1C}">
                   <a14:useLocalDpi xmlns:a14="http://schemas.microsoft.com/office/drawing/2010/main" val="0"/>
@@ -9987,7 +10115,7 @@
                     <a:schemeClr val="tx1"/>
                   </a:solidFill>
                 </a:rPr>
-                <a:t>Ei</a:t>
+                <a:t>dE</a:t>
               </a:r>
               <a:r>
                 <a:rPr lang="en-GB" sz="1400" dirty="0" smtClean="0">
@@ -10368,7 +10496,7 @@
             <p:nvPr/>
           </p:nvPicPr>
           <p:blipFill>
-            <a:blip r:embed="rId12" cstate="print">
+            <a:blip r:embed="rId14" cstate="print">
               <a:extLst>
                 <a:ext uri="{28A0092B-C50C-407E-A947-70E740481C1C}">
                   <a14:useLocalDpi xmlns:a14="http://schemas.microsoft.com/office/drawing/2010/main" val="0"/>
@@ -10471,7 +10599,7 @@
                     <a:schemeClr val="tx1"/>
                   </a:solidFill>
                 </a:rPr>
-                <a:t>Ei</a:t>
+                <a:t>dE</a:t>
               </a:r>
               <a:r>
                 <a:rPr lang="en-GB" sz="1400" dirty="0" smtClean="0">
@@ -10867,7 +10995,7 @@
             <p:nvPr/>
           </p:nvPicPr>
           <p:blipFill>
-            <a:blip r:embed="rId13" cstate="print">
+            <a:blip r:embed="rId15" cstate="print">
               <a:extLst>
                 <a:ext uri="{28A0092B-C50C-407E-A947-70E740481C1C}">
                   <a14:useLocalDpi xmlns:a14="http://schemas.microsoft.com/office/drawing/2010/main" val="0"/>
@@ -10970,7 +11098,7 @@
                     <a:schemeClr val="tx1"/>
                   </a:solidFill>
                 </a:rPr>
-                <a:t>Ei</a:t>
+                <a:t>dE</a:t>
               </a:r>
               <a:r>
                 <a:rPr lang="en-GB" sz="1400" dirty="0" smtClean="0">
@@ -12753,7 +12881,7 @@
           <p:nvPr/>
         </p:nvPicPr>
         <p:blipFill>
-          <a:blip r:embed="rId14" cstate="print">
+          <a:blip r:embed="rId16" cstate="print">
             <a:extLst>
               <a:ext uri="{28A0092B-C50C-407E-A947-70E740481C1C}">
                 <a14:useLocalDpi xmlns:a14="http://schemas.microsoft.com/office/drawing/2010/main" val="0"/>
@@ -12816,7 +12944,7 @@
         </p:nvSpPr>
         <p:spPr>
           <a:xfrm>
-            <a:off x="3717032" y="1745164"/>
+            <a:off x="3717032" y="1619672"/>
             <a:ext cx="1008112" cy="288032"/>
           </a:xfrm>
           <a:prstGeom prst="rect">
@@ -12856,7 +12984,7 @@
                   <a:schemeClr val="tx1"/>
                 </a:solidFill>
               </a:rPr>
-              <a:t>Ei</a:t>
+              <a:t>dE</a:t>
             </a:r>
             <a:r>
               <a:rPr lang="en-GB" sz="1400" dirty="0" smtClean="0">
@@ -12874,70 +13002,6 @@
           </a:p>
         </p:txBody>
       </p:sp>
-      <p:pic>
-        <p:nvPicPr>
-          <p:cNvPr id="1039" name="Picture 15"/>
-          <p:cNvPicPr>
-            <a:picLocks noChangeAspect="1" noChangeArrowheads="1"/>
-          </p:cNvPicPr>
-          <p:nvPr/>
-        </p:nvPicPr>
-        <p:blipFill>
-          <a:blip r:embed="rId15" cstate="print">
-            <a:extLst>
-              <a:ext uri="{28A0092B-C50C-407E-A947-70E740481C1C}">
-                <a14:useLocalDpi xmlns:a14="http://schemas.microsoft.com/office/drawing/2010/main" val="0"/>
-              </a:ext>
-            </a:extLst>
-          </a:blip>
-          <a:srcRect/>
-          <a:stretch>
-            <a:fillRect/>
-          </a:stretch>
-        </p:blipFill>
-        <p:spPr bwMode="auto">
-          <a:xfrm>
-            <a:off x="3296894" y="3347864"/>
-            <a:ext cx="1920397" cy="1440000"/>
-          </a:xfrm>
-          <a:prstGeom prst="rect">
-            <a:avLst/>
-          </a:prstGeom>
-          <a:noFill/>
-          <a:ln>
-            <a:noFill/>
-          </a:ln>
-          <a:effectLst/>
-          <a:extLst>
-            <a:ext uri="{909E8E84-426E-40DD-AFC4-6F175D3DCCD1}">
-              <a14:hiddenFill xmlns:a14="http://schemas.microsoft.com/office/drawing/2010/main">
-                <a:solidFill>
-                  <a:schemeClr val="accent1"/>
-                </a:solidFill>
-              </a14:hiddenFill>
-            </a:ext>
-            <a:ext uri="{91240B29-F687-4F45-9708-019B960494DF}">
-              <a14:hiddenLine xmlns:a14="http://schemas.microsoft.com/office/drawing/2010/main" w="9525">
-                <a:solidFill>
-                  <a:schemeClr val="tx1"/>
-                </a:solidFill>
-                <a:miter lim="800000"/>
-                <a:headEnd/>
-                <a:tailEnd/>
-              </a14:hiddenLine>
-            </a:ext>
-            <a:ext uri="{AF507438-7753-43E0-B8FC-AC1667EBCBE1}">
-              <a14:hiddenEffects xmlns:a14="http://schemas.microsoft.com/office/drawing/2010/main">
-                <a:effectLst>
-                  <a:outerShdw dist="35921" dir="2700000" algn="ctr" rotWithShape="0">
-                    <a:schemeClr val="bg2"/>
-                  </a:outerShdw>
-                </a:effectLst>
-              </a14:hiddenEffects>
-            </a:ext>
-          </a:extLst>
-        </p:spPr>
-      </p:pic>
       <p:sp>
         <p:nvSpPr>
           <p:cNvPr id="184" name="Rectangle 183"/>
@@ -12986,7 +13050,7 @@
                   <a:schemeClr val="tx1"/>
                 </a:solidFill>
               </a:rPr>
-              <a:t>Ei</a:t>
+              <a:t>dE</a:t>
             </a:r>
             <a:r>
               <a:rPr lang="en-GB" sz="1400" dirty="0" smtClean="0">
@@ -13007,136 +13071,6 @@
       <p:pic>
         <p:nvPicPr>
           <p:cNvPr id="1040" name="Picture 16"/>
-          <p:cNvPicPr>
-            <a:picLocks noChangeAspect="1" noChangeArrowheads="1"/>
-          </p:cNvPicPr>
-          <p:nvPr/>
-        </p:nvPicPr>
-        <p:blipFill>
-          <a:blip r:embed="rId16" cstate="print">
-            <a:extLst>
-              <a:ext uri="{28A0092B-C50C-407E-A947-70E740481C1C}">
-                <a14:useLocalDpi xmlns:a14="http://schemas.microsoft.com/office/drawing/2010/main" val="0"/>
-              </a:ext>
-            </a:extLst>
-          </a:blip>
-          <a:srcRect/>
-          <a:stretch>
-            <a:fillRect/>
-          </a:stretch>
-        </p:blipFill>
-        <p:spPr bwMode="auto">
-          <a:xfrm>
-            <a:off x="3296894" y="4788024"/>
-            <a:ext cx="1920397" cy="1440000"/>
-          </a:xfrm>
-          <a:prstGeom prst="rect">
-            <a:avLst/>
-          </a:prstGeom>
-          <a:noFill/>
-          <a:ln>
-            <a:noFill/>
-          </a:ln>
-          <a:effectLst/>
-          <a:extLst>
-            <a:ext uri="{909E8E84-426E-40DD-AFC4-6F175D3DCCD1}">
-              <a14:hiddenFill xmlns:a14="http://schemas.microsoft.com/office/drawing/2010/main">
-                <a:solidFill>
-                  <a:schemeClr val="accent1"/>
-                </a:solidFill>
-              </a14:hiddenFill>
-            </a:ext>
-            <a:ext uri="{91240B29-F687-4F45-9708-019B960494DF}">
-              <a14:hiddenLine xmlns:a14="http://schemas.microsoft.com/office/drawing/2010/main" w="9525">
-                <a:solidFill>
-                  <a:schemeClr val="tx1"/>
-                </a:solidFill>
-                <a:miter lim="800000"/>
-                <a:headEnd/>
-                <a:tailEnd/>
-              </a14:hiddenLine>
-            </a:ext>
-            <a:ext uri="{AF507438-7753-43E0-B8FC-AC1667EBCBE1}">
-              <a14:hiddenEffects xmlns:a14="http://schemas.microsoft.com/office/drawing/2010/main">
-                <a:effectLst>
-                  <a:outerShdw dist="35921" dir="2700000" algn="ctr" rotWithShape="0">
-                    <a:schemeClr val="bg2"/>
-                  </a:outerShdw>
-                </a:effectLst>
-              </a14:hiddenEffects>
-            </a:ext>
-          </a:extLst>
-        </p:spPr>
-      </p:pic>
-      <p:sp>
-        <p:nvSpPr>
-          <p:cNvPr id="186" name="Rectangle 185"/>
-          <p:cNvSpPr/>
-          <p:nvPr/>
-        </p:nvSpPr>
-        <p:spPr>
-          <a:xfrm>
-            <a:off x="3717032" y="4716016"/>
-            <a:ext cx="1008112" cy="288032"/>
-          </a:xfrm>
-          <a:prstGeom prst="rect">
-            <a:avLst/>
-          </a:prstGeom>
-          <a:solidFill>
-            <a:schemeClr val="bg1"/>
-          </a:solidFill>
-          <a:ln>
-            <a:noFill/>
-          </a:ln>
-        </p:spPr>
-        <p:style>
-          <a:lnRef idx="2">
-            <a:schemeClr val="accent1">
-              <a:shade val="50000"/>
-            </a:schemeClr>
-          </a:lnRef>
-          <a:fillRef idx="1">
-            <a:schemeClr val="accent1"/>
-          </a:fillRef>
-          <a:effectRef idx="0">
-            <a:schemeClr val="accent1"/>
-          </a:effectRef>
-          <a:fontRef idx="minor">
-            <a:schemeClr val="lt1"/>
-          </a:fontRef>
-        </p:style>
-        <p:txBody>
-          <a:bodyPr rtlCol="0" anchor="ctr"/>
-          <a:lstStyle/>
-          <a:p>
-            <a:pPr algn="ctr"/>
-            <a:r>
-              <a:rPr lang="en-GB" sz="1400" dirty="0" err="1" smtClean="0">
-                <a:solidFill>
-                  <a:schemeClr val="tx1"/>
-                </a:solidFill>
-              </a:rPr>
-              <a:t>Ei</a:t>
-            </a:r>
-            <a:r>
-              <a:rPr lang="en-GB" sz="1400" dirty="0" smtClean="0">
-                <a:solidFill>
-                  <a:schemeClr val="tx1"/>
-                </a:solidFill>
-              </a:rPr>
-              <a:t>=260+20</a:t>
-            </a:r>
-            <a:endParaRPr lang="en-GB" sz="1400" dirty="0">
-              <a:solidFill>
-                <a:schemeClr val="tx1"/>
-              </a:solidFill>
-            </a:endParaRPr>
-          </a:p>
-        </p:txBody>
-      </p:sp>
-      <p:pic>
-        <p:nvPicPr>
-          <p:cNvPr id="1041" name="Picture 17"/>
           <p:cNvPicPr>
             <a:picLocks noChangeAspect="1" noChangeArrowheads="1"/>
           </p:cNvPicPr>
@@ -13157,7 +13091,7 @@
         </p:blipFill>
         <p:spPr bwMode="auto">
           <a:xfrm>
-            <a:off x="3296894" y="6192260"/>
+            <a:off x="3296894" y="4788024"/>
             <a:ext cx="1920397" cy="1440000"/>
           </a:xfrm>
           <a:prstGeom prst="rect">
@@ -13200,13 +13134,13 @@
       </p:pic>
       <p:sp>
         <p:nvSpPr>
-          <p:cNvPr id="188" name="Rectangle 187"/>
+          <p:cNvPr id="186" name="Rectangle 185"/>
           <p:cNvSpPr/>
           <p:nvPr/>
         </p:nvSpPr>
         <p:spPr>
           <a:xfrm>
-            <a:off x="3717032" y="6156176"/>
+            <a:off x="3717032" y="4716016"/>
             <a:ext cx="1008112" cy="288032"/>
           </a:xfrm>
           <a:prstGeom prst="rect">
@@ -13246,7 +13180,7 @@
                   <a:schemeClr val="tx1"/>
                 </a:solidFill>
               </a:rPr>
-              <a:t>Ei</a:t>
+              <a:t>dE</a:t>
             </a:r>
             <a:r>
               <a:rPr lang="en-GB" sz="1400" dirty="0" smtClean="0">
@@ -13254,7 +13188,7 @@
                   <a:schemeClr val="tx1"/>
                 </a:solidFill>
               </a:rPr>
-              <a:t>=280+20</a:t>
+              <a:t>=260+20</a:t>
             </a:r>
             <a:endParaRPr lang="en-GB" sz="1400" dirty="0">
               <a:solidFill>
@@ -13264,44 +13198,9 @@
           </a:p>
         </p:txBody>
       </p:sp>
-      <p:cxnSp>
-        <p:nvCxnSpPr>
-          <p:cNvPr id="37" name="Straight Connector 36"/>
-          <p:cNvCxnSpPr/>
-          <p:nvPr/>
-        </p:nvCxnSpPr>
-        <p:spPr>
-          <a:xfrm>
-            <a:off x="4354781" y="1547664"/>
-            <a:ext cx="0" cy="5961424"/>
-          </a:xfrm>
-          <a:prstGeom prst="line">
-            <a:avLst/>
-          </a:prstGeom>
-          <a:ln>
-            <a:solidFill>
-              <a:srgbClr val="FF0000"/>
-            </a:solidFill>
-          </a:ln>
-        </p:spPr>
-        <p:style>
-          <a:lnRef idx="1">
-            <a:schemeClr val="accent1"/>
-          </a:lnRef>
-          <a:fillRef idx="0">
-            <a:schemeClr val="accent1"/>
-          </a:fillRef>
-          <a:effectRef idx="0">
-            <a:schemeClr val="accent1"/>
-          </a:effectRef>
-          <a:fontRef idx="minor">
-            <a:schemeClr val="tx1"/>
-          </a:fontRef>
-        </p:style>
-      </p:cxnSp>
       <p:pic>
         <p:nvPicPr>
-          <p:cNvPr id="1042" name="Picture 18"/>
+          <p:cNvPr id="1041" name="Picture 17"/>
           <p:cNvPicPr>
             <a:picLocks noChangeAspect="1" noChangeArrowheads="1"/>
           </p:cNvPicPr>
@@ -13322,7 +13221,7 @@
         </p:blipFill>
         <p:spPr bwMode="auto">
           <a:xfrm>
-            <a:off x="4941168" y="6192260"/>
+            <a:off x="3296894" y="6192260"/>
             <a:ext cx="1920397" cy="1440000"/>
           </a:xfrm>
           <a:prstGeom prst="rect">
@@ -13365,13 +13264,13 @@
       </p:pic>
       <p:sp>
         <p:nvSpPr>
-          <p:cNvPr id="193" name="Rectangle 192"/>
+          <p:cNvPr id="188" name="Rectangle 187"/>
           <p:cNvSpPr/>
           <p:nvPr/>
         </p:nvSpPr>
         <p:spPr>
           <a:xfrm>
-            <a:off x="5301208" y="5940152"/>
+            <a:off x="3717032" y="6156176"/>
             <a:ext cx="1008112" cy="288032"/>
           </a:xfrm>
           <a:prstGeom prst="rect">
@@ -13411,7 +13310,7 @@
                   <a:schemeClr val="tx1"/>
                 </a:solidFill>
               </a:rPr>
-              <a:t>Ei</a:t>
+              <a:t>dE</a:t>
             </a:r>
             <a:r>
               <a:rPr lang="en-GB" sz="1400" dirty="0" smtClean="0">
@@ -13419,7 +13318,7 @@
                   <a:schemeClr val="tx1"/>
                 </a:solidFill>
               </a:rPr>
-              <a:t>=360+20</a:t>
+              <a:t>=280+20</a:t>
             </a:r>
             <a:endParaRPr lang="en-GB" sz="1400" dirty="0">
               <a:solidFill>
@@ -13429,6 +13328,105 @@
           </a:p>
         </p:txBody>
       </p:sp>
+      <p:cxnSp>
+        <p:nvCxnSpPr>
+          <p:cNvPr id="37" name="Straight Connector 36"/>
+          <p:cNvCxnSpPr/>
+          <p:nvPr/>
+        </p:nvCxnSpPr>
+        <p:spPr>
+          <a:xfrm>
+            <a:off x="4354781" y="1547664"/>
+            <a:ext cx="0" cy="5961424"/>
+          </a:xfrm>
+          <a:prstGeom prst="line">
+            <a:avLst/>
+          </a:prstGeom>
+          <a:ln>
+            <a:solidFill>
+              <a:srgbClr val="FF0000"/>
+            </a:solidFill>
+          </a:ln>
+        </p:spPr>
+        <p:style>
+          <a:lnRef idx="1">
+            <a:schemeClr val="accent1"/>
+          </a:lnRef>
+          <a:fillRef idx="0">
+            <a:schemeClr val="accent1"/>
+          </a:fillRef>
+          <a:effectRef idx="0">
+            <a:schemeClr val="accent1"/>
+          </a:effectRef>
+          <a:fontRef idx="minor">
+            <a:schemeClr val="tx1"/>
+          </a:fontRef>
+        </p:style>
+      </p:cxnSp>
+      <p:pic>
+        <p:nvPicPr>
+          <p:cNvPr id="1042" name="Picture 18"/>
+          <p:cNvPicPr>
+            <a:picLocks noChangeAspect="1" noChangeArrowheads="1"/>
+          </p:cNvPicPr>
+          <p:nvPr/>
+        </p:nvPicPr>
+        <p:blipFill>
+          <a:blip r:embed="rId19" cstate="print">
+            <a:extLst>
+              <a:ext uri="{28A0092B-C50C-407E-A947-70E740481C1C}">
+                <a14:useLocalDpi xmlns:a14="http://schemas.microsoft.com/office/drawing/2010/main" val="0"/>
+              </a:ext>
+            </a:extLst>
+          </a:blip>
+          <a:srcRect/>
+          <a:stretch>
+            <a:fillRect/>
+          </a:stretch>
+        </p:blipFill>
+        <p:spPr bwMode="auto">
+          <a:xfrm>
+            <a:off x="4941168" y="6192260"/>
+            <a:ext cx="1920397" cy="1440000"/>
+          </a:xfrm>
+          <a:prstGeom prst="rect">
+            <a:avLst/>
+          </a:prstGeom>
+          <a:noFill/>
+          <a:ln>
+            <a:noFill/>
+          </a:ln>
+          <a:effectLst/>
+          <a:extLst>
+            <a:ext uri="{909E8E84-426E-40DD-AFC4-6F175D3DCCD1}">
+              <a14:hiddenFill xmlns:a14="http://schemas.microsoft.com/office/drawing/2010/main">
+                <a:solidFill>
+                  <a:schemeClr val="accent1"/>
+                </a:solidFill>
+              </a14:hiddenFill>
+            </a:ext>
+            <a:ext uri="{91240B29-F687-4F45-9708-019B960494DF}">
+              <a14:hiddenLine xmlns:a14="http://schemas.microsoft.com/office/drawing/2010/main" w="9525">
+                <a:solidFill>
+                  <a:schemeClr val="tx1"/>
+                </a:solidFill>
+                <a:miter lim="800000"/>
+                <a:headEnd/>
+                <a:tailEnd/>
+              </a14:hiddenLine>
+            </a:ext>
+            <a:ext uri="{AF507438-7753-43E0-B8FC-AC1667EBCBE1}">
+              <a14:hiddenEffects xmlns:a14="http://schemas.microsoft.com/office/drawing/2010/main">
+                <a:effectLst>
+                  <a:outerShdw dist="35921" dir="2700000" algn="ctr" rotWithShape="0">
+                    <a:schemeClr val="bg2"/>
+                  </a:outerShdw>
+                </a:effectLst>
+              </a14:hiddenEffects>
+            </a:ext>
+          </a:extLst>
+        </p:spPr>
+      </p:pic>
       <p:cxnSp>
         <p:nvCxnSpPr>
           <p:cNvPr id="194" name="Straight Connector 193"/>
@@ -13520,6 +13518,586 @@
               <a:srgbClr val="FF0000"/>
             </a:solidFill>
             <a:prstDash val="dash"/>
+          </a:ln>
+        </p:spPr>
+        <p:style>
+          <a:lnRef idx="1">
+            <a:schemeClr val="accent1"/>
+          </a:lnRef>
+          <a:fillRef idx="0">
+            <a:schemeClr val="accent1"/>
+          </a:fillRef>
+          <a:effectRef idx="0">
+            <a:schemeClr val="accent1"/>
+          </a:effectRef>
+          <a:fontRef idx="minor">
+            <a:schemeClr val="tx1"/>
+          </a:fontRef>
+        </p:style>
+      </p:cxnSp>
+      <p:pic>
+        <p:nvPicPr>
+          <p:cNvPr id="1043" name="Picture 19"/>
+          <p:cNvPicPr>
+            <a:picLocks noChangeAspect="1" noChangeArrowheads="1"/>
+          </p:cNvPicPr>
+          <p:nvPr/>
+        </p:nvPicPr>
+        <p:blipFill>
+          <a:blip r:embed="rId20" cstate="print">
+            <a:extLst>
+              <a:ext uri="{28A0092B-C50C-407E-A947-70E740481C1C}">
+                <a14:useLocalDpi xmlns:a14="http://schemas.microsoft.com/office/drawing/2010/main" val="0"/>
+              </a:ext>
+            </a:extLst>
+          </a:blip>
+          <a:srcRect/>
+          <a:stretch>
+            <a:fillRect/>
+          </a:stretch>
+        </p:blipFill>
+        <p:spPr bwMode="auto">
+          <a:xfrm>
+            <a:off x="4892979" y="467544"/>
+            <a:ext cx="1920397" cy="1440000"/>
+          </a:xfrm>
+          <a:prstGeom prst="rect">
+            <a:avLst/>
+          </a:prstGeom>
+          <a:noFill/>
+          <a:ln>
+            <a:noFill/>
+          </a:ln>
+          <a:effectLst/>
+          <a:extLst>
+            <a:ext uri="{909E8E84-426E-40DD-AFC4-6F175D3DCCD1}">
+              <a14:hiddenFill xmlns:a14="http://schemas.microsoft.com/office/drawing/2010/main">
+                <a:solidFill>
+                  <a:schemeClr val="accent1"/>
+                </a:solidFill>
+              </a14:hiddenFill>
+            </a:ext>
+            <a:ext uri="{91240B29-F687-4F45-9708-019B960494DF}">
+              <a14:hiddenLine xmlns:a14="http://schemas.microsoft.com/office/drawing/2010/main" w="9525">
+                <a:solidFill>
+                  <a:schemeClr val="tx1"/>
+                </a:solidFill>
+                <a:miter lim="800000"/>
+                <a:headEnd/>
+                <a:tailEnd/>
+              </a14:hiddenLine>
+            </a:ext>
+            <a:ext uri="{AF507438-7753-43E0-B8FC-AC1667EBCBE1}">
+              <a14:hiddenEffects xmlns:a14="http://schemas.microsoft.com/office/drawing/2010/main">
+                <a:effectLst>
+                  <a:outerShdw dist="35921" dir="2700000" algn="ctr" rotWithShape="0">
+                    <a:schemeClr val="bg2"/>
+                  </a:outerShdw>
+                </a:effectLst>
+              </a14:hiddenEffects>
+            </a:ext>
+          </a:extLst>
+        </p:spPr>
+      </p:pic>
+      <p:pic>
+        <p:nvPicPr>
+          <p:cNvPr id="1044" name="Picture 20"/>
+          <p:cNvPicPr>
+            <a:picLocks noChangeAspect="1" noChangeArrowheads="1"/>
+          </p:cNvPicPr>
+          <p:nvPr/>
+        </p:nvPicPr>
+        <p:blipFill>
+          <a:blip r:embed="rId21" cstate="print">
+            <a:extLst>
+              <a:ext uri="{28A0092B-C50C-407E-A947-70E740481C1C}">
+                <a14:useLocalDpi xmlns:a14="http://schemas.microsoft.com/office/drawing/2010/main" val="0"/>
+              </a:ext>
+            </a:extLst>
+          </a:blip>
+          <a:srcRect/>
+          <a:stretch>
+            <a:fillRect/>
+          </a:stretch>
+        </p:blipFill>
+        <p:spPr bwMode="auto">
+          <a:xfrm>
+            <a:off x="4892979" y="1907864"/>
+            <a:ext cx="1920397" cy="1440000"/>
+          </a:xfrm>
+          <a:prstGeom prst="rect">
+            <a:avLst/>
+          </a:prstGeom>
+          <a:noFill/>
+          <a:ln>
+            <a:noFill/>
+          </a:ln>
+          <a:effectLst/>
+          <a:extLst>
+            <a:ext uri="{909E8E84-426E-40DD-AFC4-6F175D3DCCD1}">
+              <a14:hiddenFill xmlns:a14="http://schemas.microsoft.com/office/drawing/2010/main">
+                <a:solidFill>
+                  <a:schemeClr val="accent1"/>
+                </a:solidFill>
+              </a14:hiddenFill>
+            </a:ext>
+            <a:ext uri="{91240B29-F687-4F45-9708-019B960494DF}">
+              <a14:hiddenLine xmlns:a14="http://schemas.microsoft.com/office/drawing/2010/main" w="9525">
+                <a:solidFill>
+                  <a:schemeClr val="tx1"/>
+                </a:solidFill>
+                <a:miter lim="800000"/>
+                <a:headEnd/>
+                <a:tailEnd/>
+              </a14:hiddenLine>
+            </a:ext>
+            <a:ext uri="{AF507438-7753-43E0-B8FC-AC1667EBCBE1}">
+              <a14:hiddenEffects xmlns:a14="http://schemas.microsoft.com/office/drawing/2010/main">
+                <a:effectLst>
+                  <a:outerShdw dist="35921" dir="2700000" algn="ctr" rotWithShape="0">
+                    <a:schemeClr val="bg2"/>
+                  </a:outerShdw>
+                </a:effectLst>
+              </a14:hiddenEffects>
+            </a:ext>
+          </a:extLst>
+        </p:spPr>
+      </p:pic>
+      <p:pic>
+        <p:nvPicPr>
+          <p:cNvPr id="1046" name="Picture 22"/>
+          <p:cNvPicPr>
+            <a:picLocks noChangeAspect="1" noChangeArrowheads="1"/>
+          </p:cNvPicPr>
+          <p:nvPr/>
+        </p:nvPicPr>
+        <p:blipFill>
+          <a:blip r:embed="rId22" cstate="print">
+            <a:extLst>
+              <a:ext uri="{28A0092B-C50C-407E-A947-70E740481C1C}">
+                <a14:useLocalDpi xmlns:a14="http://schemas.microsoft.com/office/drawing/2010/main" val="0"/>
+              </a:ext>
+            </a:extLst>
+          </a:blip>
+          <a:srcRect/>
+          <a:stretch>
+            <a:fillRect/>
+          </a:stretch>
+        </p:blipFill>
+        <p:spPr bwMode="auto">
+          <a:xfrm>
+            <a:off x="4941168" y="4650513"/>
+            <a:ext cx="1920397" cy="1440000"/>
+          </a:xfrm>
+          <a:prstGeom prst="rect">
+            <a:avLst/>
+          </a:prstGeom>
+          <a:noFill/>
+          <a:ln>
+            <a:noFill/>
+          </a:ln>
+          <a:effectLst/>
+          <a:extLst>
+            <a:ext uri="{909E8E84-426E-40DD-AFC4-6F175D3DCCD1}">
+              <a14:hiddenFill xmlns:a14="http://schemas.microsoft.com/office/drawing/2010/main">
+                <a:solidFill>
+                  <a:schemeClr val="accent1"/>
+                </a:solidFill>
+              </a14:hiddenFill>
+            </a:ext>
+            <a:ext uri="{91240B29-F687-4F45-9708-019B960494DF}">
+              <a14:hiddenLine xmlns:a14="http://schemas.microsoft.com/office/drawing/2010/main" w="9525">
+                <a:solidFill>
+                  <a:schemeClr val="tx1"/>
+                </a:solidFill>
+                <a:miter lim="800000"/>
+                <a:headEnd/>
+                <a:tailEnd/>
+              </a14:hiddenLine>
+            </a:ext>
+            <a:ext uri="{AF507438-7753-43E0-B8FC-AC1667EBCBE1}">
+              <a14:hiddenEffects xmlns:a14="http://schemas.microsoft.com/office/drawing/2010/main">
+                <a:effectLst>
+                  <a:outerShdw dist="35921" dir="2700000" algn="ctr" rotWithShape="0">
+                    <a:schemeClr val="bg2"/>
+                  </a:outerShdw>
+                </a:effectLst>
+              </a14:hiddenEffects>
+            </a:ext>
+          </a:extLst>
+        </p:spPr>
+      </p:pic>
+      <p:sp>
+        <p:nvSpPr>
+          <p:cNvPr id="193" name="Rectangle 192"/>
+          <p:cNvSpPr/>
+          <p:nvPr/>
+        </p:nvSpPr>
+        <p:spPr>
+          <a:xfrm>
+            <a:off x="5301208" y="5940152"/>
+            <a:ext cx="1008112" cy="288032"/>
+          </a:xfrm>
+          <a:prstGeom prst="rect">
+            <a:avLst/>
+          </a:prstGeom>
+          <a:solidFill>
+            <a:schemeClr val="bg1"/>
+          </a:solidFill>
+          <a:ln>
+            <a:noFill/>
+          </a:ln>
+        </p:spPr>
+        <p:style>
+          <a:lnRef idx="2">
+            <a:schemeClr val="accent1">
+              <a:shade val="50000"/>
+            </a:schemeClr>
+          </a:lnRef>
+          <a:fillRef idx="1">
+            <a:schemeClr val="accent1"/>
+          </a:fillRef>
+          <a:effectRef idx="0">
+            <a:schemeClr val="accent1"/>
+          </a:effectRef>
+          <a:fontRef idx="minor">
+            <a:schemeClr val="lt1"/>
+          </a:fontRef>
+        </p:style>
+        <p:txBody>
+          <a:bodyPr rtlCol="0" anchor="ctr"/>
+          <a:lstStyle/>
+          <a:p>
+            <a:pPr algn="ctr"/>
+            <a:r>
+              <a:rPr lang="en-GB" sz="1400" dirty="0" err="1" smtClean="0">
+                <a:solidFill>
+                  <a:schemeClr val="tx1"/>
+                </a:solidFill>
+              </a:rPr>
+              <a:t>dE</a:t>
+            </a:r>
+            <a:r>
+              <a:rPr lang="en-GB" sz="1400" dirty="0" smtClean="0">
+                <a:solidFill>
+                  <a:schemeClr val="tx1"/>
+                </a:solidFill>
+              </a:rPr>
+              <a:t>=360+20</a:t>
+            </a:r>
+            <a:endParaRPr lang="en-GB" sz="1400" dirty="0">
+              <a:solidFill>
+                <a:schemeClr val="tx1"/>
+              </a:solidFill>
+            </a:endParaRPr>
+          </a:p>
+        </p:txBody>
+      </p:sp>
+      <p:pic>
+        <p:nvPicPr>
+          <p:cNvPr id="3" name="Picture 2"/>
+          <p:cNvPicPr>
+            <a:picLocks noChangeAspect="1" noChangeArrowheads="1"/>
+          </p:cNvPicPr>
+          <p:nvPr/>
+        </p:nvPicPr>
+        <p:blipFill>
+          <a:blip r:embed="rId23" cstate="print">
+            <a:extLst>
+              <a:ext uri="{28A0092B-C50C-407E-A947-70E740481C1C}">
+                <a14:useLocalDpi xmlns:a14="http://schemas.microsoft.com/office/drawing/2010/main" val="0"/>
+              </a:ext>
+            </a:extLst>
+          </a:blip>
+          <a:srcRect/>
+          <a:stretch>
+            <a:fillRect/>
+          </a:stretch>
+        </p:blipFill>
+        <p:spPr bwMode="auto">
+          <a:xfrm>
+            <a:off x="5013176" y="7668344"/>
+            <a:ext cx="1837358" cy="1440000"/>
+          </a:xfrm>
+          <a:prstGeom prst="rect">
+            <a:avLst/>
+          </a:prstGeom>
+          <a:noFill/>
+          <a:ln>
+            <a:noFill/>
+          </a:ln>
+          <a:effectLst/>
+          <a:extLst>
+            <a:ext uri="{909E8E84-426E-40DD-AFC4-6F175D3DCCD1}">
+              <a14:hiddenFill xmlns:a14="http://schemas.microsoft.com/office/drawing/2010/main">
+                <a:solidFill>
+                  <a:schemeClr val="accent1"/>
+                </a:solidFill>
+              </a14:hiddenFill>
+            </a:ext>
+            <a:ext uri="{91240B29-F687-4F45-9708-019B960494DF}">
+              <a14:hiddenLine xmlns:a14="http://schemas.microsoft.com/office/drawing/2010/main" w="9525">
+                <a:solidFill>
+                  <a:schemeClr val="tx1"/>
+                </a:solidFill>
+                <a:miter lim="800000"/>
+                <a:headEnd/>
+                <a:tailEnd/>
+              </a14:hiddenLine>
+            </a:ext>
+            <a:ext uri="{AF507438-7753-43E0-B8FC-AC1667EBCBE1}">
+              <a14:hiddenEffects xmlns:a14="http://schemas.microsoft.com/office/drawing/2010/main">
+                <a:effectLst>
+                  <a:outerShdw dist="35921" dir="2700000" algn="ctr" rotWithShape="0">
+                    <a:schemeClr val="bg2"/>
+                  </a:outerShdw>
+                </a:effectLst>
+              </a14:hiddenEffects>
+            </a:ext>
+          </a:extLst>
+        </p:spPr>
+      </p:pic>
+      <p:sp>
+        <p:nvSpPr>
+          <p:cNvPr id="5" name="TextBox 4"/>
+          <p:cNvSpPr txBox="1"/>
+          <p:nvPr/>
+        </p:nvSpPr>
+        <p:spPr>
+          <a:xfrm>
+            <a:off x="5217291" y="7818952"/>
+            <a:ext cx="979755" cy="200055"/>
+          </a:xfrm>
+          <a:prstGeom prst="rect">
+            <a:avLst/>
+          </a:prstGeom>
+          <a:noFill/>
+        </p:spPr>
+        <p:txBody>
+          <a:bodyPr wrap="none" rtlCol="0">
+            <a:spAutoFit/>
+          </a:bodyPr>
+          <a:lstStyle/>
+          <a:p>
+            <a:r>
+              <a:rPr lang="en-GB" sz="700" dirty="0" smtClean="0">
+                <a:solidFill>
+                  <a:srgbClr val="FF0000"/>
+                </a:solidFill>
+              </a:rPr>
+              <a:t>Removed</a:t>
+            </a:r>
+            <a:r>
+              <a:rPr lang="en-GB" sz="700" dirty="0" smtClean="0"/>
+              <a:t> </a:t>
+            </a:r>
+            <a:r>
+              <a:rPr lang="en-GB" sz="700" dirty="0" smtClean="0">
+                <a:solidFill>
+                  <a:srgbClr val="FF0000"/>
+                </a:solidFill>
+              </a:rPr>
+              <a:t>background</a:t>
+            </a:r>
+            <a:endParaRPr lang="en-GB" sz="700" dirty="0">
+              <a:solidFill>
+                <a:srgbClr val="FF0000"/>
+              </a:solidFill>
+            </a:endParaRPr>
+          </a:p>
+        </p:txBody>
+      </p:sp>
+      <p:sp>
+        <p:nvSpPr>
+          <p:cNvPr id="7" name="TextBox 6"/>
+          <p:cNvSpPr txBox="1"/>
+          <p:nvPr/>
+        </p:nvSpPr>
+        <p:spPr>
+          <a:xfrm>
+            <a:off x="480022" y="145398"/>
+            <a:ext cx="816249" cy="369332"/>
+          </a:xfrm>
+          <a:prstGeom prst="rect">
+            <a:avLst/>
+          </a:prstGeom>
+          <a:noFill/>
+        </p:spPr>
+        <p:txBody>
+          <a:bodyPr wrap="none" rtlCol="0">
+            <a:spAutoFit/>
+          </a:bodyPr>
+          <a:lstStyle/>
+          <a:p>
+            <a:r>
+              <a:rPr lang="en-GB" dirty="0" err="1" smtClean="0"/>
+              <a:t>Ei</a:t>
+            </a:r>
+            <a:r>
+              <a:rPr lang="en-GB" dirty="0" smtClean="0"/>
+              <a:t>=401</a:t>
+            </a:r>
+            <a:endParaRPr lang="en-GB" dirty="0"/>
+          </a:p>
+        </p:txBody>
+      </p:sp>
+      <p:sp>
+        <p:nvSpPr>
+          <p:cNvPr id="177" name="TextBox 176"/>
+          <p:cNvSpPr txBox="1"/>
+          <p:nvPr/>
+        </p:nvSpPr>
+        <p:spPr>
+          <a:xfrm>
+            <a:off x="2003521" y="169134"/>
+            <a:ext cx="816249" cy="369332"/>
+          </a:xfrm>
+          <a:prstGeom prst="rect">
+            <a:avLst/>
+          </a:prstGeom>
+          <a:noFill/>
+        </p:spPr>
+        <p:txBody>
+          <a:bodyPr wrap="none" rtlCol="0">
+            <a:spAutoFit/>
+          </a:bodyPr>
+          <a:lstStyle/>
+          <a:p>
+            <a:r>
+              <a:rPr lang="en-GB" dirty="0" err="1" smtClean="0"/>
+              <a:t>Ei</a:t>
+            </a:r>
+            <a:r>
+              <a:rPr lang="en-GB" dirty="0" smtClean="0"/>
+              <a:t>=787</a:t>
+            </a:r>
+            <a:endParaRPr lang="en-GB" dirty="0"/>
+          </a:p>
+        </p:txBody>
+      </p:sp>
+      <p:sp>
+        <p:nvSpPr>
+          <p:cNvPr id="178" name="TextBox 177"/>
+          <p:cNvSpPr txBox="1"/>
+          <p:nvPr/>
+        </p:nvSpPr>
+        <p:spPr>
+          <a:xfrm>
+            <a:off x="3836887" y="1106324"/>
+            <a:ext cx="816249" cy="369332"/>
+          </a:xfrm>
+          <a:prstGeom prst="rect">
+            <a:avLst/>
+          </a:prstGeom>
+          <a:noFill/>
+        </p:spPr>
+        <p:txBody>
+          <a:bodyPr wrap="none" rtlCol="0">
+            <a:spAutoFit/>
+          </a:bodyPr>
+          <a:lstStyle/>
+          <a:p>
+            <a:r>
+              <a:rPr lang="en-GB" dirty="0" err="1" smtClean="0"/>
+              <a:t>Ei</a:t>
+            </a:r>
+            <a:r>
+              <a:rPr lang="en-GB" dirty="0" smtClean="0"/>
+              <a:t>=787</a:t>
+            </a:r>
+            <a:endParaRPr lang="en-GB" dirty="0"/>
+          </a:p>
+        </p:txBody>
+      </p:sp>
+      <p:sp>
+        <p:nvSpPr>
+          <p:cNvPr id="179" name="TextBox 178"/>
+          <p:cNvSpPr txBox="1"/>
+          <p:nvPr/>
+        </p:nvSpPr>
+        <p:spPr>
+          <a:xfrm>
+            <a:off x="524519" y="7082988"/>
+            <a:ext cx="816249" cy="369332"/>
+          </a:xfrm>
+          <a:prstGeom prst="rect">
+            <a:avLst/>
+          </a:prstGeom>
+          <a:noFill/>
+        </p:spPr>
+        <p:txBody>
+          <a:bodyPr wrap="none" rtlCol="0">
+            <a:spAutoFit/>
+          </a:bodyPr>
+          <a:lstStyle/>
+          <a:p>
+            <a:r>
+              <a:rPr lang="en-GB" dirty="0" err="1" smtClean="0"/>
+              <a:t>Ei</a:t>
+            </a:r>
+            <a:r>
+              <a:rPr lang="en-GB" dirty="0" smtClean="0"/>
+              <a:t>=787</a:t>
+            </a:r>
+            <a:endParaRPr lang="en-GB" dirty="0"/>
+          </a:p>
+        </p:txBody>
+      </p:sp>
+      <p:sp>
+        <p:nvSpPr>
+          <p:cNvPr id="8" name="TextBox 7"/>
+          <p:cNvSpPr txBox="1"/>
+          <p:nvPr/>
+        </p:nvSpPr>
+        <p:spPr>
+          <a:xfrm>
+            <a:off x="6385342" y="3215041"/>
+            <a:ext cx="402674" cy="307777"/>
+          </a:xfrm>
+          <a:prstGeom prst="rect">
+            <a:avLst/>
+          </a:prstGeom>
+          <a:noFill/>
+        </p:spPr>
+        <p:txBody>
+          <a:bodyPr wrap="none" rtlCol="0">
+            <a:spAutoFit/>
+          </a:bodyPr>
+          <a:lstStyle/>
+          <a:p>
+            <a:r>
+              <a:rPr lang="en-GB" sz="1400" dirty="0" smtClean="0">
+                <a:latin typeface="Symbol" panose="05050102010706020507" pitchFamily="18" charset="2"/>
+              </a:rPr>
+              <a:t>P?</a:t>
+            </a:r>
+            <a:endParaRPr lang="en-GB" sz="1400" dirty="0">
+              <a:latin typeface="Symbol" panose="05050102010706020507" pitchFamily="18" charset="2"/>
+            </a:endParaRPr>
+          </a:p>
+        </p:txBody>
+      </p:sp>
+      <p:cxnSp>
+        <p:nvCxnSpPr>
+          <p:cNvPr id="10" name="Straight Arrow Connector 9"/>
+          <p:cNvCxnSpPr>
+            <a:stCxn id="8" idx="2"/>
+          </p:cNvCxnSpPr>
+          <p:nvPr/>
+        </p:nvCxnSpPr>
+        <p:spPr>
+          <a:xfrm flipH="1">
+            <a:off x="6021288" y="3522818"/>
+            <a:ext cx="565391" cy="322468"/>
+          </a:xfrm>
+          <a:prstGeom prst="straightConnector1">
+            <a:avLst/>
+          </a:prstGeom>
+          <a:ln>
+            <a:solidFill>
+              <a:srgbClr val="FF0000"/>
+            </a:solidFill>
+            <a:tailEnd type="arrow"/>
           </a:ln>
         </p:spPr>
         <p:style>

</xml_diff>

<commit_message>
Updating repo with minor changes from  laptop drive.
Former-commit-id: aac2da92b29a70bbbfec3f919d8593b4d56d7a23
</commit_message>
<xml_diff>
--- a/Jan2015/Summary2015.pptx
+++ b/Jan2015/Summary2015.pptx
@@ -291,7 +291,7 @@
           <a:p>
             <a:fld id="{103F0B6B-0F34-4B60-AA46-B717113E1AE3}" type="datetimeFigureOut">
               <a:rPr lang="en-GB" smtClean="0"/>
-              <a:t>06/01/2015</a:t>
+              <a:t>09/07/2015</a:t>
             </a:fld>
             <a:endParaRPr lang="en-GB"/>
           </a:p>
@@ -461,7 +461,7 @@
           <a:p>
             <a:fld id="{103F0B6B-0F34-4B60-AA46-B717113E1AE3}" type="datetimeFigureOut">
               <a:rPr lang="en-GB" smtClean="0"/>
-              <a:t>06/01/2015</a:t>
+              <a:t>09/07/2015</a:t>
             </a:fld>
             <a:endParaRPr lang="en-GB"/>
           </a:p>
@@ -641,7 +641,7 @@
           <a:p>
             <a:fld id="{103F0B6B-0F34-4B60-AA46-B717113E1AE3}" type="datetimeFigureOut">
               <a:rPr lang="en-GB" smtClean="0"/>
-              <a:t>06/01/2015</a:t>
+              <a:t>09/07/2015</a:t>
             </a:fld>
             <a:endParaRPr lang="en-GB"/>
           </a:p>
@@ -811,7 +811,7 @@
           <a:p>
             <a:fld id="{103F0B6B-0F34-4B60-AA46-B717113E1AE3}" type="datetimeFigureOut">
               <a:rPr lang="en-GB" smtClean="0"/>
-              <a:t>06/01/2015</a:t>
+              <a:t>09/07/2015</a:t>
             </a:fld>
             <a:endParaRPr lang="en-GB"/>
           </a:p>
@@ -1057,7 +1057,7 @@
           <a:p>
             <a:fld id="{103F0B6B-0F34-4B60-AA46-B717113E1AE3}" type="datetimeFigureOut">
               <a:rPr lang="en-GB" smtClean="0"/>
-              <a:t>06/01/2015</a:t>
+              <a:t>09/07/2015</a:t>
             </a:fld>
             <a:endParaRPr lang="en-GB"/>
           </a:p>
@@ -1345,7 +1345,7 @@
           <a:p>
             <a:fld id="{103F0B6B-0F34-4B60-AA46-B717113E1AE3}" type="datetimeFigureOut">
               <a:rPr lang="en-GB" smtClean="0"/>
-              <a:t>06/01/2015</a:t>
+              <a:t>09/07/2015</a:t>
             </a:fld>
             <a:endParaRPr lang="en-GB"/>
           </a:p>
@@ -1767,7 +1767,7 @@
           <a:p>
             <a:fld id="{103F0B6B-0F34-4B60-AA46-B717113E1AE3}" type="datetimeFigureOut">
               <a:rPr lang="en-GB" smtClean="0"/>
-              <a:t>06/01/2015</a:t>
+              <a:t>09/07/2015</a:t>
             </a:fld>
             <a:endParaRPr lang="en-GB"/>
           </a:p>
@@ -1885,7 +1885,7 @@
           <a:p>
             <a:fld id="{103F0B6B-0F34-4B60-AA46-B717113E1AE3}" type="datetimeFigureOut">
               <a:rPr lang="en-GB" smtClean="0"/>
-              <a:t>06/01/2015</a:t>
+              <a:t>09/07/2015</a:t>
             </a:fld>
             <a:endParaRPr lang="en-GB"/>
           </a:p>
@@ -1980,7 +1980,7 @@
           <a:p>
             <a:fld id="{103F0B6B-0F34-4B60-AA46-B717113E1AE3}" type="datetimeFigureOut">
               <a:rPr lang="en-GB" smtClean="0"/>
-              <a:t>06/01/2015</a:t>
+              <a:t>09/07/2015</a:t>
             </a:fld>
             <a:endParaRPr lang="en-GB"/>
           </a:p>
@@ -2257,7 +2257,7 @@
           <a:p>
             <a:fld id="{103F0B6B-0F34-4B60-AA46-B717113E1AE3}" type="datetimeFigureOut">
               <a:rPr lang="en-GB" smtClean="0"/>
-              <a:t>06/01/2015</a:t>
+              <a:t>09/07/2015</a:t>
             </a:fld>
             <a:endParaRPr lang="en-GB"/>
           </a:p>
@@ -2510,7 +2510,7 @@
           <a:p>
             <a:fld id="{103F0B6B-0F34-4B60-AA46-B717113E1AE3}" type="datetimeFigureOut">
               <a:rPr lang="en-GB" smtClean="0"/>
-              <a:t>06/01/2015</a:t>
+              <a:t>09/07/2015</a:t>
             </a:fld>
             <a:endParaRPr lang="en-GB"/>
           </a:p>
@@ -2723,7 +2723,7 @@
           <a:p>
             <a:fld id="{103F0B6B-0F34-4B60-AA46-B717113E1AE3}" type="datetimeFigureOut">
               <a:rPr lang="en-GB" smtClean="0"/>
-              <a:t>06/01/2015</a:t>
+              <a:t>09/07/2015</a:t>
             </a:fld>
             <a:endParaRPr lang="en-GB"/>
           </a:p>
@@ -3719,7 +3719,7 @@
               <a:rPr lang="en-GB" sz="1400" baseline="30000" dirty="0" smtClean="0">
                 <a:latin typeface="Symbol" panose="05050102010706020507" pitchFamily="18" charset="2"/>
               </a:rPr>
-              <a:t>-2</a:t>
+              <a:t>2</a:t>
             </a:r>
             <a:r>
               <a:rPr lang="en-GB" dirty="0" smtClean="0"/>
@@ -4025,7 +4025,7 @@
               <a:rPr lang="en-GB" sz="1400" baseline="30000" dirty="0" smtClean="0">
                 <a:latin typeface="Symbol" panose="05050102010706020507" pitchFamily="18" charset="2"/>
               </a:rPr>
-              <a:t>-2</a:t>
+              <a:t>2</a:t>
             </a:r>
             <a:r>
               <a:rPr lang="en-GB" dirty="0" smtClean="0"/>
@@ -4619,7 +4619,7 @@
               <a:rPr lang="en-GB" sz="1400" baseline="30000" dirty="0" smtClean="0">
                 <a:latin typeface="Symbol" panose="05050102010706020507" pitchFamily="18" charset="2"/>
               </a:rPr>
-              <a:t>-2</a:t>
+              <a:t>2</a:t>
             </a:r>
             <a:r>
               <a:rPr lang="en-GB" dirty="0" smtClean="0"/>
@@ -14125,6 +14125,13 @@
   <p:clrMapOvr>
     <a:masterClrMapping/>
   </p:clrMapOvr>
+  <p:timing>
+    <p:tnLst>
+      <p:par>
+        <p:cTn id="1" dur="indefinite" restart="never" nodeType="tmRoot"/>
+      </p:par>
+    </p:tnLst>
+  </p:timing>
 </p:sld>
 </file>
 

</xml_diff>